<commit_message>
Fix some bug, add final version of documentation
</commit_message>
<xml_diff>
--- a/SOURCES/RAPPORTS/Picarete - Presentation.pptx
+++ b/SOURCES/RAPPORTS/Picarete - Presentation.pptx
@@ -4743,7 +4743,19 @@
         <a:p>
           <a:r>
             <a:rPr lang="fr-FR" dirty="0" smtClean="0"/>
-            <a:t>Mode toute les cases libres</a:t>
+            <a:t>Mode </a:t>
+          </a:r>
+          <a:r>
+            <a:rPr lang="fr-FR" dirty="0" smtClean="0"/>
+            <a:t>« toutes </a:t>
+          </a:r>
+          <a:r>
+            <a:rPr lang="fr-FR" dirty="0" smtClean="0"/>
+            <a:t>les cases </a:t>
+          </a:r>
+          <a:r>
+            <a:rPr lang="fr-FR" dirty="0" smtClean="0"/>
+            <a:t>libres »</a:t>
           </a:r>
           <a:endParaRPr lang="fr-FR" dirty="0"/>
         </a:p>
@@ -5118,10 +5130,10 @@
         <a:lstStyle/>
         <a:p>
           <a:r>
-            <a:rPr lang="fr-FR" sz="1600" b="1" dirty="0" smtClean="0"/>
+            <a:rPr lang="fr-FR" sz="1400" b="1" dirty="0" smtClean="0"/>
             <a:t>Visite tardive chez le client</a:t>
           </a:r>
-          <a:endParaRPr lang="fr-FR" sz="1600" b="1" dirty="0"/>
+          <a:endParaRPr lang="fr-FR" sz="1400" b="1" dirty="0"/>
         </a:p>
       </dgm:t>
     </dgm:pt>
@@ -5159,10 +5171,14 @@
         <a:lstStyle/>
         <a:p>
           <a:r>
-            <a:rPr lang="fr-FR" sz="1600" b="1" dirty="0" smtClean="0"/>
-            <a:t>Réflexion en duo</a:t>
+            <a:rPr lang="fr-FR" sz="1200" b="1" dirty="0" smtClean="0"/>
+            <a:t>Réflexion </a:t>
           </a:r>
-          <a:endParaRPr lang="fr-FR" sz="1600" b="1" dirty="0"/>
+          <a:r>
+            <a:rPr lang="fr-FR" sz="1200" b="1" dirty="0" smtClean="0"/>
+            <a:t>en duo</a:t>
+          </a:r>
+          <a:endParaRPr lang="fr-FR" sz="1200" b="1" dirty="0"/>
         </a:p>
       </dgm:t>
     </dgm:pt>
@@ -5274,10 +5290,10 @@
         <a:lstStyle/>
         <a:p>
           <a:r>
-            <a:rPr lang="fr-FR" sz="1400" dirty="0" smtClean="0"/>
+            <a:rPr lang="fr-FR" sz="1000" dirty="0" smtClean="0"/>
             <a:t>Réalisation de diagrammes</a:t>
           </a:r>
-          <a:endParaRPr lang="fr-FR" sz="1400" dirty="0"/>
+          <a:endParaRPr lang="fr-FR" sz="1000" dirty="0"/>
         </a:p>
       </dgm:t>
     </dgm:pt>
@@ -5311,10 +5327,10 @@
         <a:lstStyle/>
         <a:p>
           <a:r>
-            <a:rPr lang="fr-FR" sz="1400" dirty="0" smtClean="0"/>
+            <a:rPr lang="fr-FR" sz="1200" dirty="0" smtClean="0"/>
             <a:t>Discutions</a:t>
           </a:r>
-          <a:endParaRPr lang="fr-FR" sz="1400" dirty="0"/>
+          <a:endParaRPr lang="fr-FR" sz="1200" dirty="0"/>
         </a:p>
       </dgm:t>
     </dgm:pt>
@@ -5390,7 +5406,15 @@
         <a:p>
           <a:r>
             <a:rPr lang="fr-FR" sz="1400" dirty="0" smtClean="0"/>
-            <a:t>Mode de jeux</a:t>
+            <a:t>Modes </a:t>
+          </a:r>
+          <a:r>
+            <a:rPr lang="fr-FR" sz="1400" dirty="0" smtClean="0"/>
+            <a:t>de </a:t>
+          </a:r>
+          <a:r>
+            <a:rPr lang="fr-FR" sz="1400" dirty="0" smtClean="0"/>
+            <a:t>jeu</a:t>
           </a:r>
           <a:endParaRPr lang="fr-FR" sz="1400" dirty="0"/>
         </a:p>
@@ -5463,10 +5487,10 @@
         <a:lstStyle/>
         <a:p>
           <a:r>
-            <a:rPr lang="fr-FR" sz="1400" dirty="0" smtClean="0"/>
+            <a:rPr lang="fr-FR" sz="1100" dirty="0" smtClean="0"/>
             <a:t>Expérience</a:t>
           </a:r>
-          <a:endParaRPr lang="fr-FR" sz="1400" dirty="0"/>
+          <a:endParaRPr lang="fr-FR" sz="1100" dirty="0"/>
         </a:p>
       </dgm:t>
     </dgm:pt>
@@ -5540,6 +5564,13 @@
         </dgm:presLayoutVars>
       </dgm:prSet>
       <dgm:spPr/>
+      <dgm:t>
+        <a:bodyPr/>
+        <a:lstStyle/>
+        <a:p>
+          <a:endParaRPr lang="fr-FR"/>
+        </a:p>
+      </dgm:t>
     </dgm:pt>
     <dgm:pt modelId="{5B26CE0C-6671-4DE0-806A-E91AF80F6F8D}" type="pres">
       <dgm:prSet presAssocID="{EF9A8299-6A3C-4A42-8173-8E38C0AB7563}" presName="vertOne" presStyleCnt="0"/>
@@ -5552,6 +5583,13 @@
         </dgm:presLayoutVars>
       </dgm:prSet>
       <dgm:spPr/>
+      <dgm:t>
+        <a:bodyPr/>
+        <a:lstStyle/>
+        <a:p>
+          <a:endParaRPr lang="fr-FR"/>
+        </a:p>
+      </dgm:t>
     </dgm:pt>
     <dgm:pt modelId="{2C2E6B64-E22E-4780-94F2-1A4BD7DF40EE}" type="pres">
       <dgm:prSet presAssocID="{EF9A8299-6A3C-4A42-8173-8E38C0AB7563}" presName="parTransOne" presStyleCnt="0"/>
@@ -5626,6 +5664,13 @@
         </dgm:presLayoutVars>
       </dgm:prSet>
       <dgm:spPr/>
+      <dgm:t>
+        <a:bodyPr/>
+        <a:lstStyle/>
+        <a:p>
+          <a:endParaRPr lang="fr-FR"/>
+        </a:p>
+      </dgm:t>
     </dgm:pt>
     <dgm:pt modelId="{23C82963-4029-4DF0-AA1C-203CC5359E40}" type="pres">
       <dgm:prSet presAssocID="{02B69B2F-3F76-469C-AED6-5E0BAFBD728E}" presName="horzThree" presStyleCnt="0"/>
@@ -5673,6 +5718,13 @@
         </dgm:presLayoutVars>
       </dgm:prSet>
       <dgm:spPr/>
+      <dgm:t>
+        <a:bodyPr/>
+        <a:lstStyle/>
+        <a:p>
+          <a:endParaRPr lang="fr-FR"/>
+        </a:p>
+      </dgm:t>
     </dgm:pt>
     <dgm:pt modelId="{10004589-E9AA-48B9-B357-D40340CD378A}" type="pres">
       <dgm:prSet presAssocID="{2F90EF0E-A25C-437E-A122-4D01B111CE46}" presName="horzThree" presStyleCnt="0"/>
@@ -5693,6 +5745,13 @@
         </dgm:presLayoutVars>
       </dgm:prSet>
       <dgm:spPr/>
+      <dgm:t>
+        <a:bodyPr/>
+        <a:lstStyle/>
+        <a:p>
+          <a:endParaRPr lang="fr-FR"/>
+        </a:p>
+      </dgm:t>
     </dgm:pt>
     <dgm:pt modelId="{0D6B150E-9FBE-49D4-B5C9-EAEF642B1AB4}" type="pres">
       <dgm:prSet presAssocID="{FCCF829A-83EB-4B3E-93A0-E8667CCFB826}" presName="horzTwo" presStyleCnt="0"/>
@@ -5740,6 +5799,13 @@
         </dgm:presLayoutVars>
       </dgm:prSet>
       <dgm:spPr/>
+      <dgm:t>
+        <a:bodyPr/>
+        <a:lstStyle/>
+        <a:p>
+          <a:endParaRPr lang="fr-FR"/>
+        </a:p>
+      </dgm:t>
     </dgm:pt>
     <dgm:pt modelId="{8C72994F-35E5-48BD-AC8E-8854BE3AB793}" type="pres">
       <dgm:prSet presAssocID="{04563406-EBC2-4436-95AD-3FD11424FCF9}" presName="horzThree" presStyleCnt="0"/>
@@ -5828,31 +5894,31 @@
     </dgm:pt>
   </dgm:ptLst>
   <dgm:cxnLst>
+    <dgm:cxn modelId="{40AB4B14-0232-4A24-8759-721E64BA615A}" srcId="{C72CBFE9-8AD7-4F62-A545-29989D3B525D}" destId="{75BF5C31-CD00-43CE-82D6-B42C76E1CCBC}" srcOrd="3" destOrd="0" parTransId="{73E9B5AC-62AE-4FD0-ADDA-5B2ED2E0B55E}" sibTransId="{6BF81F36-55CC-44CA-B439-E6F6FA0E2AB4}"/>
+    <dgm:cxn modelId="{4D6D1B59-D424-48DD-8ADC-11319D19CFB0}" srcId="{C72CBFE9-8AD7-4F62-A545-29989D3B525D}" destId="{C9DDCC7F-86D4-4BE7-A9A8-6413E9DBBD6F}" srcOrd="2" destOrd="0" parTransId="{714A104E-6DF8-4AA8-92E5-49DA2A87A525}" sibTransId="{3DA750D0-73E1-4EC4-ABB5-456BF20D9B93}"/>
+    <dgm:cxn modelId="{D49EABD7-122F-4382-895F-AA4667B3F7DC}" type="presOf" srcId="{96C99BD9-D39D-4E79-A0FC-A80CD40196B4}" destId="{C6E75D01-B709-42DD-BB3A-D2A6E3A86A54}" srcOrd="0" destOrd="0" presId="urn:microsoft.com/office/officeart/2005/8/layout/hierarchy4"/>
+    <dgm:cxn modelId="{57026F53-6A5B-4547-BADE-CF1C04185AA7}" type="presOf" srcId="{04563406-EBC2-4436-95AD-3FD11424FCF9}" destId="{06D6984F-EDEB-446B-9AD3-A39C5B875929}" srcOrd="0" destOrd="0" presId="urn:microsoft.com/office/officeart/2005/8/layout/hierarchy4"/>
+    <dgm:cxn modelId="{512E2D53-A36D-4EB1-9270-533BB554B838}" type="presOf" srcId="{75BF5C31-CD00-43CE-82D6-B42C76E1CCBC}" destId="{BD389ECC-BFEB-4292-B847-1029DFA7CE82}" srcOrd="0" destOrd="0" presId="urn:microsoft.com/office/officeart/2005/8/layout/hierarchy4"/>
+    <dgm:cxn modelId="{B8133530-86D0-48E2-B0D3-78E83469B3DD}" type="presOf" srcId="{C9DDCC7F-86D4-4BE7-A9A8-6413E9DBBD6F}" destId="{D98C62A2-0132-4FA1-ABF9-3D27B9CBCDCF}" srcOrd="0" destOrd="0" presId="urn:microsoft.com/office/officeart/2005/8/layout/hierarchy4"/>
+    <dgm:cxn modelId="{9BA29E4E-9BE9-44FA-9369-C0744F9D3A58}" type="presOf" srcId="{1A3F1C50-6AAB-4E16-8DEC-9ED91C017DE0}" destId="{A7D5872E-BA91-49E6-A240-2F7C8597A343}" srcOrd="0" destOrd="0" presId="urn:microsoft.com/office/officeart/2005/8/layout/hierarchy4"/>
+    <dgm:cxn modelId="{B7999C29-AA92-4643-B205-643C9783C00C}" type="presOf" srcId="{2BCDDF1B-2515-4A89-BAC8-44C3F9C426F5}" destId="{8D899F32-CAF5-43E8-9870-403956F998DE}" srcOrd="0" destOrd="0" presId="urn:microsoft.com/office/officeart/2005/8/layout/hierarchy4"/>
+    <dgm:cxn modelId="{88B7F601-7063-4B2B-A52C-67B18A7CE1AD}" type="presOf" srcId="{02B69B2F-3F76-469C-AED6-5E0BAFBD728E}" destId="{A93F4BCE-1C05-442F-A3C6-59EAB5DCF493}" srcOrd="0" destOrd="0" presId="urn:microsoft.com/office/officeart/2005/8/layout/hierarchy4"/>
+    <dgm:cxn modelId="{A5E63933-D255-421E-AB77-8E8DFC4FD20B}" type="presOf" srcId="{2F90EF0E-A25C-437E-A122-4D01B111CE46}" destId="{CDE4C558-3A91-47CF-86EB-4371B02905C1}" srcOrd="0" destOrd="0" presId="urn:microsoft.com/office/officeart/2005/8/layout/hierarchy4"/>
+    <dgm:cxn modelId="{558C5F17-8D66-42F3-A4B9-55861AB245AD}" srcId="{1A3F1C50-6AAB-4E16-8DEC-9ED91C017DE0}" destId="{EF9A8299-6A3C-4A42-8173-8E38C0AB7563}" srcOrd="0" destOrd="0" parTransId="{59ED7FA7-B825-45AD-972B-D1DC48E96EEA}" sibTransId="{E1F33D8C-5954-4796-9BA4-8C112E0BECC7}"/>
+    <dgm:cxn modelId="{5932C66A-0D7B-471B-99F5-23306EF12776}" srcId="{917987DE-5243-451D-A42A-08F45C180F00}" destId="{2BCDDF1B-2515-4A89-BAC8-44C3F9C426F5}" srcOrd="1" destOrd="0" parTransId="{D4F03E67-93F6-4A2B-A045-9BBE621638BA}" sibTransId="{F92FE978-6D30-49F9-B838-91292D0F9C60}"/>
+    <dgm:cxn modelId="{165949B2-EC22-4B8C-92D4-E6BAE8CC856E}" type="presOf" srcId="{FCCF829A-83EB-4B3E-93A0-E8667CCFB826}" destId="{CD3A8499-1EC4-495A-8A15-5F0BBCC6A49A}" srcOrd="0" destOrd="0" presId="urn:microsoft.com/office/officeart/2005/8/layout/hierarchy4"/>
+    <dgm:cxn modelId="{20C07A88-0EAC-4DAA-9736-F9C6533E5624}" srcId="{EF9A8299-6A3C-4A42-8173-8E38C0AB7563}" destId="{FCCF829A-83EB-4B3E-93A0-E8667CCFB826}" srcOrd="2" destOrd="0" parTransId="{364C3CB9-93F8-4EA6-95F8-05FE9B926E82}" sibTransId="{CAED91A0-D48C-4F57-8622-C498903307B9}"/>
+    <dgm:cxn modelId="{6939CC4B-DD0F-425E-AB3D-EC6A82904197}" type="presOf" srcId="{02E6726D-7DA0-41C4-A7B1-6B726E919D13}" destId="{9B094FC9-D884-4C0D-908D-68F0EB143AA1}" srcOrd="0" destOrd="0" presId="urn:microsoft.com/office/officeart/2005/8/layout/hierarchy4"/>
+    <dgm:cxn modelId="{F3DFC6B3-A760-4C9B-A94C-9C5D501CE3A6}" srcId="{EF9A8299-6A3C-4A42-8173-8E38C0AB7563}" destId="{C72CBFE9-8AD7-4F62-A545-29989D3B525D}" srcOrd="3" destOrd="0" parTransId="{95E2E7F5-6FEB-4F04-8334-469D4C09C87F}" sibTransId="{8AAA3C1A-70F6-4888-B184-CF0FC3603280}"/>
+    <dgm:cxn modelId="{FD3F525E-3B1B-4EEE-B25F-B1D8B5CD6C8C}" srcId="{C72CBFE9-8AD7-4F62-A545-29989D3B525D}" destId="{96C99BD9-D39D-4E79-A0FC-A80CD40196B4}" srcOrd="1" destOrd="0" parTransId="{53366AF1-B3DC-40D6-9482-BE297D119CCE}" sibTransId="{E75DE20E-8EC0-45D4-A187-FEEEE5F314F7}"/>
+    <dgm:cxn modelId="{DEF82C44-D745-41D1-A48B-00161AEE518B}" srcId="{EF9A8299-6A3C-4A42-8173-8E38C0AB7563}" destId="{917987DE-5243-451D-A42A-08F45C180F00}" srcOrd="1" destOrd="0" parTransId="{B9134AE3-F832-4FAF-BA8A-62A34676BBC1}" sibTransId="{E91D5210-9FE1-4885-B156-8C82B79CE120}"/>
     <dgm:cxn modelId="{86DDCBA5-ABFC-43D6-9C4C-AB1F5CA38D4B}" srcId="{917987DE-5243-451D-A42A-08F45C180F00}" destId="{02B69B2F-3F76-469C-AED6-5E0BAFBD728E}" srcOrd="0" destOrd="0" parTransId="{D3C8CCC6-EDD0-4549-81B8-FE0EA3E16402}" sibTransId="{D1123B94-E7D5-4A3A-A79E-9BDF3BBD4DC0}"/>
-    <dgm:cxn modelId="{4D6D1B59-D424-48DD-8ADC-11319D19CFB0}" srcId="{C72CBFE9-8AD7-4F62-A545-29989D3B525D}" destId="{C9DDCC7F-86D4-4BE7-A9A8-6413E9DBBD6F}" srcOrd="2" destOrd="0" parTransId="{714A104E-6DF8-4AA8-92E5-49DA2A87A525}" sibTransId="{3DA750D0-73E1-4EC4-ABB5-456BF20D9B93}"/>
-    <dgm:cxn modelId="{A5E63933-D255-421E-AB77-8E8DFC4FD20B}" type="presOf" srcId="{2F90EF0E-A25C-437E-A122-4D01B111CE46}" destId="{CDE4C558-3A91-47CF-86EB-4371B02905C1}" srcOrd="0" destOrd="0" presId="urn:microsoft.com/office/officeart/2005/8/layout/hierarchy4"/>
+    <dgm:cxn modelId="{459C6CED-7940-466C-B808-DEAA9BDFAE6A}" type="presOf" srcId="{EF9A8299-6A3C-4A42-8173-8E38C0AB7563}" destId="{538F1CD5-4D1E-4E54-BF72-AB1C5F36FA1E}" srcOrd="0" destOrd="0" presId="urn:microsoft.com/office/officeart/2005/8/layout/hierarchy4"/>
+    <dgm:cxn modelId="{F116F8B4-AACC-46B5-97C5-84E5A22D2C4F}" type="presOf" srcId="{917987DE-5243-451D-A42A-08F45C180F00}" destId="{533933CF-7191-4436-BF14-37ABED44D47D}" srcOrd="0" destOrd="0" presId="urn:microsoft.com/office/officeart/2005/8/layout/hierarchy4"/>
+    <dgm:cxn modelId="{BB9659E2-A497-499F-A678-B2026FE5BAA2}" type="presOf" srcId="{C72CBFE9-8AD7-4F62-A545-29989D3B525D}" destId="{2BDCF045-D02D-499A-938C-6A8F9010B1F6}" srcOrd="0" destOrd="0" presId="urn:microsoft.com/office/officeart/2005/8/layout/hierarchy4"/>
     <dgm:cxn modelId="{C5719A32-53D0-4E16-82AB-426DB2BD6AEC}" srcId="{C72CBFE9-8AD7-4F62-A545-29989D3B525D}" destId="{04563406-EBC2-4436-95AD-3FD11424FCF9}" srcOrd="0" destOrd="0" parTransId="{EA99A2B3-65C6-47A3-861C-F269BB181E0A}" sibTransId="{91D8C654-E6C9-4332-BBD5-D90903A74C6B}"/>
-    <dgm:cxn modelId="{D49EABD7-122F-4382-895F-AA4667B3F7DC}" type="presOf" srcId="{96C99BD9-D39D-4E79-A0FC-A80CD40196B4}" destId="{C6E75D01-B709-42DD-BB3A-D2A6E3A86A54}" srcOrd="0" destOrd="0" presId="urn:microsoft.com/office/officeart/2005/8/layout/hierarchy4"/>
-    <dgm:cxn modelId="{88B7F601-7063-4B2B-A52C-67B18A7CE1AD}" type="presOf" srcId="{02B69B2F-3F76-469C-AED6-5E0BAFBD728E}" destId="{A93F4BCE-1C05-442F-A3C6-59EAB5DCF493}" srcOrd="0" destOrd="0" presId="urn:microsoft.com/office/officeart/2005/8/layout/hierarchy4"/>
-    <dgm:cxn modelId="{40AB4B14-0232-4A24-8759-721E64BA615A}" srcId="{C72CBFE9-8AD7-4F62-A545-29989D3B525D}" destId="{75BF5C31-CD00-43CE-82D6-B42C76E1CCBC}" srcOrd="3" destOrd="0" parTransId="{73E9B5AC-62AE-4FD0-ADDA-5B2ED2E0B55E}" sibTransId="{6BF81F36-55CC-44CA-B439-E6F6FA0E2AB4}"/>
-    <dgm:cxn modelId="{DEF82C44-D745-41D1-A48B-00161AEE518B}" srcId="{EF9A8299-6A3C-4A42-8173-8E38C0AB7563}" destId="{917987DE-5243-451D-A42A-08F45C180F00}" srcOrd="1" destOrd="0" parTransId="{B9134AE3-F832-4FAF-BA8A-62A34676BBC1}" sibTransId="{E91D5210-9FE1-4885-B156-8C82B79CE120}"/>
     <dgm:cxn modelId="{FF6DF708-65DC-4EDD-BBEC-A9E0B18293D1}" srcId="{EF9A8299-6A3C-4A42-8173-8E38C0AB7563}" destId="{02E6726D-7DA0-41C4-A7B1-6B726E919D13}" srcOrd="0" destOrd="0" parTransId="{14583D93-99EC-4C9E-9109-6A546BC7466B}" sibTransId="{90C346C5-D65A-411F-A79B-A6F7D2B905EC}"/>
-    <dgm:cxn modelId="{57026F53-6A5B-4547-BADE-CF1C04185AA7}" type="presOf" srcId="{04563406-EBC2-4436-95AD-3FD11424FCF9}" destId="{06D6984F-EDEB-446B-9AD3-A39C5B875929}" srcOrd="0" destOrd="0" presId="urn:microsoft.com/office/officeart/2005/8/layout/hierarchy4"/>
     <dgm:cxn modelId="{5D04BEED-D109-445C-B445-04E6FBB12D74}" srcId="{917987DE-5243-451D-A42A-08F45C180F00}" destId="{2F90EF0E-A25C-437E-A122-4D01B111CE46}" srcOrd="2" destOrd="0" parTransId="{A792B45D-5530-41EE-ACE2-670C2B18B723}" sibTransId="{81705748-569E-4426-B2D2-8FE0A8D4B499}"/>
-    <dgm:cxn modelId="{BB9659E2-A497-499F-A678-B2026FE5BAA2}" type="presOf" srcId="{C72CBFE9-8AD7-4F62-A545-29989D3B525D}" destId="{2BDCF045-D02D-499A-938C-6A8F9010B1F6}" srcOrd="0" destOrd="0" presId="urn:microsoft.com/office/officeart/2005/8/layout/hierarchy4"/>
-    <dgm:cxn modelId="{B8133530-86D0-48E2-B0D3-78E83469B3DD}" type="presOf" srcId="{C9DDCC7F-86D4-4BE7-A9A8-6413E9DBBD6F}" destId="{D98C62A2-0132-4FA1-ABF9-3D27B9CBCDCF}" srcOrd="0" destOrd="0" presId="urn:microsoft.com/office/officeart/2005/8/layout/hierarchy4"/>
-    <dgm:cxn modelId="{459C6CED-7940-466C-B808-DEAA9BDFAE6A}" type="presOf" srcId="{EF9A8299-6A3C-4A42-8173-8E38C0AB7563}" destId="{538F1CD5-4D1E-4E54-BF72-AB1C5F36FA1E}" srcOrd="0" destOrd="0" presId="urn:microsoft.com/office/officeart/2005/8/layout/hierarchy4"/>
-    <dgm:cxn modelId="{165949B2-EC22-4B8C-92D4-E6BAE8CC856E}" type="presOf" srcId="{FCCF829A-83EB-4B3E-93A0-E8667CCFB826}" destId="{CD3A8499-1EC4-495A-8A15-5F0BBCC6A49A}" srcOrd="0" destOrd="0" presId="urn:microsoft.com/office/officeart/2005/8/layout/hierarchy4"/>
-    <dgm:cxn modelId="{5932C66A-0D7B-471B-99F5-23306EF12776}" srcId="{917987DE-5243-451D-A42A-08F45C180F00}" destId="{2BCDDF1B-2515-4A89-BAC8-44C3F9C426F5}" srcOrd="1" destOrd="0" parTransId="{D4F03E67-93F6-4A2B-A045-9BBE621638BA}" sibTransId="{F92FE978-6D30-49F9-B838-91292D0F9C60}"/>
-    <dgm:cxn modelId="{512E2D53-A36D-4EB1-9270-533BB554B838}" type="presOf" srcId="{75BF5C31-CD00-43CE-82D6-B42C76E1CCBC}" destId="{BD389ECC-BFEB-4292-B847-1029DFA7CE82}" srcOrd="0" destOrd="0" presId="urn:microsoft.com/office/officeart/2005/8/layout/hierarchy4"/>
-    <dgm:cxn modelId="{F116F8B4-AACC-46B5-97C5-84E5A22D2C4F}" type="presOf" srcId="{917987DE-5243-451D-A42A-08F45C180F00}" destId="{533933CF-7191-4436-BF14-37ABED44D47D}" srcOrd="0" destOrd="0" presId="urn:microsoft.com/office/officeart/2005/8/layout/hierarchy4"/>
-    <dgm:cxn modelId="{B7999C29-AA92-4643-B205-643C9783C00C}" type="presOf" srcId="{2BCDDF1B-2515-4A89-BAC8-44C3F9C426F5}" destId="{8D899F32-CAF5-43E8-9870-403956F998DE}" srcOrd="0" destOrd="0" presId="urn:microsoft.com/office/officeart/2005/8/layout/hierarchy4"/>
-    <dgm:cxn modelId="{20C07A88-0EAC-4DAA-9736-F9C6533E5624}" srcId="{EF9A8299-6A3C-4A42-8173-8E38C0AB7563}" destId="{FCCF829A-83EB-4B3E-93A0-E8667CCFB826}" srcOrd="2" destOrd="0" parTransId="{364C3CB9-93F8-4EA6-95F8-05FE9B926E82}" sibTransId="{CAED91A0-D48C-4F57-8622-C498903307B9}"/>
-    <dgm:cxn modelId="{9BA29E4E-9BE9-44FA-9369-C0744F9D3A58}" type="presOf" srcId="{1A3F1C50-6AAB-4E16-8DEC-9ED91C017DE0}" destId="{A7D5872E-BA91-49E6-A240-2F7C8597A343}" srcOrd="0" destOrd="0" presId="urn:microsoft.com/office/officeart/2005/8/layout/hierarchy4"/>
-    <dgm:cxn modelId="{558C5F17-8D66-42F3-A4B9-55861AB245AD}" srcId="{1A3F1C50-6AAB-4E16-8DEC-9ED91C017DE0}" destId="{EF9A8299-6A3C-4A42-8173-8E38C0AB7563}" srcOrd="0" destOrd="0" parTransId="{59ED7FA7-B825-45AD-972B-D1DC48E96EEA}" sibTransId="{E1F33D8C-5954-4796-9BA4-8C112E0BECC7}"/>
-    <dgm:cxn modelId="{F3DFC6B3-A760-4C9B-A94C-9C5D501CE3A6}" srcId="{EF9A8299-6A3C-4A42-8173-8E38C0AB7563}" destId="{C72CBFE9-8AD7-4F62-A545-29989D3B525D}" srcOrd="3" destOrd="0" parTransId="{95E2E7F5-6FEB-4F04-8334-469D4C09C87F}" sibTransId="{8AAA3C1A-70F6-4888-B184-CF0FC3603280}"/>
-    <dgm:cxn modelId="{6939CC4B-DD0F-425E-AB3D-EC6A82904197}" type="presOf" srcId="{02E6726D-7DA0-41C4-A7B1-6B726E919D13}" destId="{9B094FC9-D884-4C0D-908D-68F0EB143AA1}" srcOrd="0" destOrd="0" presId="urn:microsoft.com/office/officeart/2005/8/layout/hierarchy4"/>
-    <dgm:cxn modelId="{FD3F525E-3B1B-4EEE-B25F-B1D8B5CD6C8C}" srcId="{C72CBFE9-8AD7-4F62-A545-29989D3B525D}" destId="{96C99BD9-D39D-4E79-A0FC-A80CD40196B4}" srcOrd="1" destOrd="0" parTransId="{53366AF1-B3DC-40D6-9482-BE297D119CCE}" sibTransId="{E75DE20E-8EC0-45D4-A187-FEEEE5F314F7}"/>
     <dgm:cxn modelId="{F10A2051-A404-4347-936F-FD70C86AC9C3}" type="presParOf" srcId="{A7D5872E-BA91-49E6-A240-2F7C8597A343}" destId="{5B26CE0C-6671-4DE0-806A-E91AF80F6F8D}" srcOrd="0" destOrd="0" presId="urn:microsoft.com/office/officeart/2005/8/layout/hierarchy4"/>
     <dgm:cxn modelId="{EDC155EA-BF6E-4281-B6A6-60DAFF2DDDF1}" type="presParOf" srcId="{5B26CE0C-6671-4DE0-806A-E91AF80F6F8D}" destId="{538F1CD5-4D1E-4E54-BF72-AB1C5F36FA1E}" srcOrd="0" destOrd="0" presId="urn:microsoft.com/office/officeart/2005/8/layout/hierarchy4"/>
     <dgm:cxn modelId="{4FC5E3AA-E221-4025-AC48-D4A4540042D1}" type="presParOf" srcId="{5B26CE0C-6671-4DE0-806A-E91AF80F6F8D}" destId="{2C2E6B64-E22E-4780-94F2-1A4BD7DF40EE}" srcOrd="1" destOrd="0" presId="urn:microsoft.com/office/officeart/2005/8/layout/hierarchy4"/>
@@ -6193,7 +6259,11 @@
         <a:p>
           <a:r>
             <a:rPr lang="fr-FR" dirty="0" smtClean="0"/>
-            <a:t>Mode de jeu</a:t>
+            <a:t>Modes de </a:t>
+          </a:r>
+          <a:r>
+            <a:rPr lang="fr-FR" dirty="0" smtClean="0"/>
+            <a:t>jeu</a:t>
           </a:r>
           <a:endParaRPr lang="fr-FR" dirty="0"/>
         </a:p>
@@ -6417,6 +6487,13 @@
         </dgm:presLayoutVars>
       </dgm:prSet>
       <dgm:spPr/>
+      <dgm:t>
+        <a:bodyPr/>
+        <a:lstStyle/>
+        <a:p>
+          <a:endParaRPr lang="fr-FR"/>
+        </a:p>
+      </dgm:t>
     </dgm:pt>
     <dgm:pt modelId="{3A234A4E-90E4-41BB-B187-83CCA00ED26C}" type="pres">
       <dgm:prSet presAssocID="{386DC484-93D5-4173-AE02-EE329513BC23}" presName="root" presStyleCnt="0"/>
@@ -6440,6 +6517,13 @@
     <dgm:pt modelId="{A9A52102-8CAB-406F-98AC-1E9ACCE32C2D}" type="pres">
       <dgm:prSet presAssocID="{386DC484-93D5-4173-AE02-EE329513BC23}" presName="rootConnector" presStyleLbl="node1" presStyleIdx="0" presStyleCnt="2"/>
       <dgm:spPr/>
+      <dgm:t>
+        <a:bodyPr/>
+        <a:lstStyle/>
+        <a:p>
+          <a:endParaRPr lang="fr-FR"/>
+        </a:p>
+      </dgm:t>
     </dgm:pt>
     <dgm:pt modelId="{EDC49465-2FB1-4D67-BAE4-2C5A2FE11D2A}" type="pres">
       <dgm:prSet presAssocID="{386DC484-93D5-4173-AE02-EE329513BC23}" presName="childShape" presStyleCnt="0"/>
@@ -6448,6 +6532,13 @@
     <dgm:pt modelId="{C52A2CCB-D58F-479B-A197-7B382995D12F}" type="pres">
       <dgm:prSet presAssocID="{C9923941-6E33-4DAE-AB56-4E5FE9BF1476}" presName="Name13" presStyleLbl="parChTrans1D2" presStyleIdx="0" presStyleCnt="4"/>
       <dgm:spPr/>
+      <dgm:t>
+        <a:bodyPr/>
+        <a:lstStyle/>
+        <a:p>
+          <a:endParaRPr lang="fr-FR"/>
+        </a:p>
+      </dgm:t>
     </dgm:pt>
     <dgm:pt modelId="{EB8E451D-4BF7-49D0-8E3F-9238F480CAD4}" type="pres">
       <dgm:prSet presAssocID="{16F5E2A0-8263-4AA7-9758-B3F5105C2CB1}" presName="childText" presStyleLbl="bgAcc1" presStyleIdx="0" presStyleCnt="4">
@@ -6467,6 +6558,13 @@
     <dgm:pt modelId="{B7ADE0B9-E349-4E5A-A1F8-4B0946D0D399}" type="pres">
       <dgm:prSet presAssocID="{E2E81EDD-E6CD-44A7-ABB2-40B3799E64EB}" presName="Name13" presStyleLbl="parChTrans1D2" presStyleIdx="1" presStyleCnt="4"/>
       <dgm:spPr/>
+      <dgm:t>
+        <a:bodyPr/>
+        <a:lstStyle/>
+        <a:p>
+          <a:endParaRPr lang="fr-FR"/>
+        </a:p>
+      </dgm:t>
     </dgm:pt>
     <dgm:pt modelId="{0FCB4556-51CD-49FD-8E59-D8F52D3BDF02}" type="pres">
       <dgm:prSet presAssocID="{1A97338E-24A1-4A22-B0C9-4527649DE448}" presName="childText" presStyleLbl="bgAcc1" presStyleIdx="1" presStyleCnt="4">
@@ -6494,10 +6592,24 @@
     <dgm:pt modelId="{076724CC-6455-48DE-9E23-68208D15650D}" type="pres">
       <dgm:prSet presAssocID="{DB2AD5B5-2EC5-401A-9B1C-1C0F78EBDBF6}" presName="rootText" presStyleLbl="node1" presStyleIdx="1" presStyleCnt="2"/>
       <dgm:spPr/>
+      <dgm:t>
+        <a:bodyPr/>
+        <a:lstStyle/>
+        <a:p>
+          <a:endParaRPr lang="fr-FR"/>
+        </a:p>
+      </dgm:t>
     </dgm:pt>
     <dgm:pt modelId="{F6C5BB1E-E57F-42FB-94C8-25C519E08500}" type="pres">
       <dgm:prSet presAssocID="{DB2AD5B5-2EC5-401A-9B1C-1C0F78EBDBF6}" presName="rootConnector" presStyleLbl="node1" presStyleIdx="1" presStyleCnt="2"/>
       <dgm:spPr/>
+      <dgm:t>
+        <a:bodyPr/>
+        <a:lstStyle/>
+        <a:p>
+          <a:endParaRPr lang="fr-FR"/>
+        </a:p>
+      </dgm:t>
     </dgm:pt>
     <dgm:pt modelId="{C3F625EE-EA31-4115-8882-DAA289B9C5C4}" type="pres">
       <dgm:prSet presAssocID="{DB2AD5B5-2EC5-401A-9B1C-1C0F78EBDBF6}" presName="childShape" presStyleCnt="0"/>
@@ -6506,6 +6618,13 @@
     <dgm:pt modelId="{57F0095A-05E7-40B4-BACC-B68A3A61B688}" type="pres">
       <dgm:prSet presAssocID="{88230482-A8F7-4DA9-92F5-43A9FD3BD057}" presName="Name13" presStyleLbl="parChTrans1D2" presStyleIdx="2" presStyleCnt="4"/>
       <dgm:spPr/>
+      <dgm:t>
+        <a:bodyPr/>
+        <a:lstStyle/>
+        <a:p>
+          <a:endParaRPr lang="fr-FR"/>
+        </a:p>
+      </dgm:t>
     </dgm:pt>
     <dgm:pt modelId="{0A0E6461-6F3F-4F95-86FB-F673DD2B4FA0}" type="pres">
       <dgm:prSet presAssocID="{F54847D7-E07F-48AC-8262-1CE762E211E3}" presName="childText" presStyleLbl="bgAcc1" presStyleIdx="2" presStyleCnt="4">
@@ -6525,6 +6644,13 @@
     <dgm:pt modelId="{7CC8C853-492B-4415-A982-BC709D7A441A}" type="pres">
       <dgm:prSet presAssocID="{66294133-362F-443C-B907-81F16CB6B183}" presName="Name13" presStyleLbl="parChTrans1D2" presStyleIdx="3" presStyleCnt="4"/>
       <dgm:spPr/>
+      <dgm:t>
+        <a:bodyPr/>
+        <a:lstStyle/>
+        <a:p>
+          <a:endParaRPr lang="fr-FR"/>
+        </a:p>
+      </dgm:t>
     </dgm:pt>
     <dgm:pt modelId="{0C5CA2D0-6B80-469E-A7AC-DCBF3B9B0F8C}" type="pres">
       <dgm:prSet presAssocID="{66DBD1C9-29C1-4137-B9E8-EEF4AF6F96E0}" presName="childText" presStyleLbl="bgAcc1" presStyleIdx="3" presStyleCnt="4">
@@ -6533,6 +6659,13 @@
         </dgm:presLayoutVars>
       </dgm:prSet>
       <dgm:spPr/>
+      <dgm:t>
+        <a:bodyPr/>
+        <a:lstStyle/>
+        <a:p>
+          <a:endParaRPr lang="fr-FR"/>
+        </a:p>
+      </dgm:t>
     </dgm:pt>
   </dgm:ptLst>
   <dgm:cxnLst>
@@ -6557,12 +6690,12 @@
     <dgm:cxn modelId="{D1E66623-32F4-4B12-BE98-25D88F4A1968}" type="presOf" srcId="{66294133-362F-443C-B907-81F16CB6B183}" destId="{7CC8C853-492B-4415-A982-BC709D7A441A}" srcOrd="0" destOrd="0" presId="urn:microsoft.com/office/officeart/2005/8/layout/hierarchy3"/>
     <dgm:cxn modelId="{29B1AC2C-25F9-44FA-A15F-1A1EB2AA6628}" type="presOf" srcId="{28E29EA0-0AD6-42D3-B88F-44D5AB28D7AE}" destId="{EB8E451D-4BF7-49D0-8E3F-9238F480CAD4}" srcOrd="0" destOrd="1" presId="urn:microsoft.com/office/officeart/2005/8/layout/hierarchy3"/>
     <dgm:cxn modelId="{5AB55243-515C-462F-862B-5BCE4F17ACBD}" type="presOf" srcId="{16F5E2A0-8263-4AA7-9758-B3F5105C2CB1}" destId="{EB8E451D-4BF7-49D0-8E3F-9238F480CAD4}" srcOrd="0" destOrd="0" presId="urn:microsoft.com/office/officeart/2005/8/layout/hierarchy3"/>
+    <dgm:cxn modelId="{EAEA18E4-37D0-4072-B089-D69B81E45A88}" srcId="{DB2AD5B5-2EC5-401A-9B1C-1C0F78EBDBF6}" destId="{66DBD1C9-29C1-4137-B9E8-EEF4AF6F96E0}" srcOrd="1" destOrd="0" parTransId="{66294133-362F-443C-B907-81F16CB6B183}" sibTransId="{7C50334E-E0AA-4EBD-B025-534156050223}"/>
+    <dgm:cxn modelId="{9F7ED2F1-011D-49F3-8BF9-B70584EAC394}" type="presOf" srcId="{E2E81EDD-E6CD-44A7-ABB2-40B3799E64EB}" destId="{B7ADE0B9-E349-4E5A-A1F8-4B0946D0D399}" srcOrd="0" destOrd="0" presId="urn:microsoft.com/office/officeart/2005/8/layout/hierarchy3"/>
     <dgm:cxn modelId="{9A047735-F9CD-40EB-A53B-BAE0A74BC766}" type="presOf" srcId="{C9923941-6E33-4DAE-AB56-4E5FE9BF1476}" destId="{C52A2CCB-D58F-479B-A197-7B382995D12F}" srcOrd="0" destOrd="0" presId="urn:microsoft.com/office/officeart/2005/8/layout/hierarchy3"/>
-    <dgm:cxn modelId="{9F7ED2F1-011D-49F3-8BF9-B70584EAC394}" type="presOf" srcId="{E2E81EDD-E6CD-44A7-ABB2-40B3799E64EB}" destId="{B7ADE0B9-E349-4E5A-A1F8-4B0946D0D399}" srcOrd="0" destOrd="0" presId="urn:microsoft.com/office/officeart/2005/8/layout/hierarchy3"/>
-    <dgm:cxn modelId="{EAEA18E4-37D0-4072-B089-D69B81E45A88}" srcId="{DB2AD5B5-2EC5-401A-9B1C-1C0F78EBDBF6}" destId="{66DBD1C9-29C1-4137-B9E8-EEF4AF6F96E0}" srcOrd="1" destOrd="0" parTransId="{66294133-362F-443C-B907-81F16CB6B183}" sibTransId="{7C50334E-E0AA-4EBD-B025-534156050223}"/>
     <dgm:cxn modelId="{FBC9D322-A01A-411F-AC90-ACB37EF0A386}" srcId="{1A97338E-24A1-4A22-B0C9-4527649DE448}" destId="{3D8CBC2D-BD4E-412A-A065-822D61CE631F}" srcOrd="0" destOrd="0" parTransId="{584A8291-1802-4047-A591-2DFCB19A752E}" sibTransId="{A91C0170-108A-41B0-B449-D5801B2AED49}"/>
+    <dgm:cxn modelId="{3611653A-A8B8-4F29-B51D-8308EC4CF5CD}" srcId="{16F5E2A0-8263-4AA7-9758-B3F5105C2CB1}" destId="{03414CF2-3CB4-472E-8049-DECDB7DFFC1B}" srcOrd="1" destOrd="0" parTransId="{CCB40CE0-9B3E-44F7-A367-55D1F9E1AAE4}" sibTransId="{A616F67D-B336-4D24-8B7E-BF3B32E0F41C}"/>
     <dgm:cxn modelId="{C4400FCF-252B-4C54-A3B3-7C47599BDD5B}" type="presOf" srcId="{66DBD1C9-29C1-4137-B9E8-EEF4AF6F96E0}" destId="{0C5CA2D0-6B80-469E-A7AC-DCBF3B9B0F8C}" srcOrd="0" destOrd="0" presId="urn:microsoft.com/office/officeart/2005/8/layout/hierarchy3"/>
-    <dgm:cxn modelId="{3611653A-A8B8-4F29-B51D-8308EC4CF5CD}" srcId="{16F5E2A0-8263-4AA7-9758-B3F5105C2CB1}" destId="{03414CF2-3CB4-472E-8049-DECDB7DFFC1B}" srcOrd="1" destOrd="0" parTransId="{CCB40CE0-9B3E-44F7-A367-55D1F9E1AAE4}" sibTransId="{A616F67D-B336-4D24-8B7E-BF3B32E0F41C}"/>
     <dgm:cxn modelId="{F73D0E4C-70BC-4622-B3CF-C67BA4087BF0}" type="presOf" srcId="{386DC484-93D5-4173-AE02-EE329513BC23}" destId="{A9A52102-8CAB-406F-98AC-1E9ACCE32C2D}" srcOrd="1" destOrd="0" presId="urn:microsoft.com/office/officeart/2005/8/layout/hierarchy3"/>
     <dgm:cxn modelId="{E89F8F94-E8EF-4CF9-A354-B0EA3BC3B7AC}" type="presOf" srcId="{386DC484-93D5-4173-AE02-EE329513BC23}" destId="{91EA1957-5247-4C56-B6FE-5354A4DE8F3D}" srcOrd="0" destOrd="0" presId="urn:microsoft.com/office/officeart/2005/8/layout/hierarchy3"/>
     <dgm:cxn modelId="{0B4B3DCA-822C-48E6-A5E0-8109867CB3E5}" type="presOf" srcId="{50D8D612-06E3-4A91-BF40-9E5BCEB94BC5}" destId="{0A0E6461-6F3F-4F95-86FB-F673DD2B4FA0}" srcOrd="0" destOrd="1" presId="urn:microsoft.com/office/officeart/2005/8/layout/hierarchy3"/>
@@ -6772,7 +6905,11 @@
         <a:p>
           <a:r>
             <a:rPr lang="fr-FR" dirty="0" smtClean="0"/>
-            <a:t>Malus arrêtes</a:t>
+            <a:t>Malus </a:t>
+          </a:r>
+          <a:r>
+            <a:rPr lang="fr-FR" dirty="0" smtClean="0"/>
+            <a:t>arrête</a:t>
           </a:r>
           <a:endParaRPr lang="fr-FR" dirty="0"/>
         </a:p>
@@ -6809,7 +6946,11 @@
         <a:p>
           <a:r>
             <a:rPr lang="fr-FR" dirty="0" smtClean="0"/>
-            <a:t>Bonus arrêtes</a:t>
+            <a:t>Bonus </a:t>
+          </a:r>
+          <a:r>
+            <a:rPr lang="fr-FR" dirty="0" smtClean="0"/>
+            <a:t>arrête</a:t>
           </a:r>
           <a:endParaRPr lang="fr-FR" dirty="0"/>
         </a:p>
@@ -7137,19 +7278,19 @@
     </dgm:pt>
   </dgm:ptLst>
   <dgm:cxnLst>
-    <dgm:cxn modelId="{46A9736A-53EB-4B1F-BEFC-A4AD9C844549}" srcId="{B471A3E4-08B3-4CD4-859C-962FC82C0FE8}" destId="{913A6484-A464-4270-8779-E13E61903069}" srcOrd="0" destOrd="0" parTransId="{F26E0483-AD84-4F57-8855-A4EEF554FB9B}" sibTransId="{45023082-6F2B-429F-8234-D13EA8E23CD5}"/>
-    <dgm:cxn modelId="{D197D5BB-1BFC-4C2A-9CEE-DEE8D5DDE044}" srcId="{B471A3E4-08B3-4CD4-859C-962FC82C0FE8}" destId="{6C1476F6-F6C3-4A18-AFF4-13189953D980}" srcOrd="5" destOrd="0" parTransId="{00BE4B73-4294-4724-B82D-B247D4583515}" sibTransId="{639CBC90-FAC6-4A8A-8C94-D8D97504547D}"/>
-    <dgm:cxn modelId="{F95CC39B-2A83-4FDE-A8D8-013E7FDF9DC8}" srcId="{B471A3E4-08B3-4CD4-859C-962FC82C0FE8}" destId="{AB6749C2-A21A-4D03-B884-70CA376B31AD}" srcOrd="1" destOrd="0" parTransId="{7ADC8336-663F-4BB6-910C-C8658652C0C6}" sibTransId="{D2B94901-85C8-4368-932B-114BC01F424C}"/>
+    <dgm:cxn modelId="{4D661F37-3BDA-4237-A79C-17A3BA961D17}" type="presOf" srcId="{913A6484-A464-4270-8779-E13E61903069}" destId="{498F0EF7-6F0E-4858-A104-13BCD01051C7}" srcOrd="0" destOrd="0" presId="urn:microsoft.com/office/officeart/2005/8/layout/vList5"/>
     <dgm:cxn modelId="{0FEC6B04-4D60-4B1E-9EC9-D48B9A69FBE3}" type="presOf" srcId="{AB6749C2-A21A-4D03-B884-70CA376B31AD}" destId="{9BD02D43-1076-41B9-9F87-BB783F00670C}" srcOrd="0" destOrd="0" presId="urn:microsoft.com/office/officeart/2005/8/layout/vList5"/>
     <dgm:cxn modelId="{10CF6E0A-F9D1-4332-90DE-6E5813EA99AC}" srcId="{B471A3E4-08B3-4CD4-859C-962FC82C0FE8}" destId="{704A3F9E-2A3C-4231-B838-51C2BF226EAD}" srcOrd="3" destOrd="0" parTransId="{F53818AD-A86A-4597-9540-B4C6B118722F}" sibTransId="{0E7D45F9-4504-4679-9AF9-23D59B5ED09F}"/>
+    <dgm:cxn modelId="{D197D5BB-1BFC-4C2A-9CEE-DEE8D5DDE044}" srcId="{B471A3E4-08B3-4CD4-859C-962FC82C0FE8}" destId="{6C1476F6-F6C3-4A18-AFF4-13189953D980}" srcOrd="5" destOrd="0" parTransId="{00BE4B73-4294-4724-B82D-B247D4583515}" sibTransId="{639CBC90-FAC6-4A8A-8C94-D8D97504547D}"/>
     <dgm:cxn modelId="{3EB32890-F3C3-4CDA-9128-534905DEA4EA}" type="presOf" srcId="{6C1476F6-F6C3-4A18-AFF4-13189953D980}" destId="{CD595CC2-6603-47A4-AC0C-0FD1E4282D8B}" srcOrd="0" destOrd="0" presId="urn:microsoft.com/office/officeart/2005/8/layout/vList5"/>
     <dgm:cxn modelId="{AF922815-CE23-4A01-BF44-6C32AE50BD29}" type="presOf" srcId="{704A3F9E-2A3C-4231-B838-51C2BF226EAD}" destId="{66D500FF-6FAC-4C00-86FA-742BA28D7D26}" srcOrd="0" destOrd="0" presId="urn:microsoft.com/office/officeart/2005/8/layout/vList5"/>
-    <dgm:cxn modelId="{4D661F37-3BDA-4237-A79C-17A3BA961D17}" type="presOf" srcId="{913A6484-A464-4270-8779-E13E61903069}" destId="{498F0EF7-6F0E-4858-A104-13BCD01051C7}" srcOrd="0" destOrd="0" presId="urn:microsoft.com/office/officeart/2005/8/layout/vList5"/>
+    <dgm:cxn modelId="{4DEF5B00-E1C2-41BF-8CCF-3D3F81577577}" type="presOf" srcId="{6CDE17FE-F043-4E3F-AABF-E9D40BD4367D}" destId="{4CC5A3B4-6EA4-4334-B5C4-914DBF4C702F}" srcOrd="0" destOrd="0" presId="urn:microsoft.com/office/officeart/2005/8/layout/vList5"/>
+    <dgm:cxn modelId="{E2B84579-2017-4AAE-B0FA-80E0DCE8EF15}" type="presOf" srcId="{B471A3E4-08B3-4CD4-859C-962FC82C0FE8}" destId="{3F2EFA31-8E42-4D75-ACA6-56E225EF8FF4}" srcOrd="0" destOrd="0" presId="urn:microsoft.com/office/officeart/2005/8/layout/vList5"/>
+    <dgm:cxn modelId="{32AE54F5-F08E-4245-BB8A-30DB58F3C050}" srcId="{B471A3E4-08B3-4CD4-859C-962FC82C0FE8}" destId="{6CDE17FE-F043-4E3F-AABF-E9D40BD4367D}" srcOrd="2" destOrd="0" parTransId="{79E5249E-303F-4C3C-9091-ED9A65803DAE}" sibTransId="{2FC0B856-D30B-42E6-88EE-0A51F15181EC}"/>
     <dgm:cxn modelId="{0D97E64D-8910-4D0C-81AA-B2BE062CC9E3}" srcId="{B471A3E4-08B3-4CD4-859C-962FC82C0FE8}" destId="{5CF413A7-F6B0-4534-B1E8-3CC5AD6C2C4D}" srcOrd="4" destOrd="0" parTransId="{ECA61EAB-A5D8-4147-9DFD-DBDF43923B65}" sibTransId="{2442E0FE-F92B-4CDC-AD42-4B818F31E8AA}"/>
     <dgm:cxn modelId="{82A75E20-101F-4297-85D7-FFB3A0C060A2}" type="presOf" srcId="{5CF413A7-F6B0-4534-B1E8-3CC5AD6C2C4D}" destId="{3FAC760A-3114-4118-8695-84ED4E516322}" srcOrd="0" destOrd="0" presId="urn:microsoft.com/office/officeart/2005/8/layout/vList5"/>
-    <dgm:cxn modelId="{4DEF5B00-E1C2-41BF-8CCF-3D3F81577577}" type="presOf" srcId="{6CDE17FE-F043-4E3F-AABF-E9D40BD4367D}" destId="{4CC5A3B4-6EA4-4334-B5C4-914DBF4C702F}" srcOrd="0" destOrd="0" presId="urn:microsoft.com/office/officeart/2005/8/layout/vList5"/>
-    <dgm:cxn modelId="{32AE54F5-F08E-4245-BB8A-30DB58F3C050}" srcId="{B471A3E4-08B3-4CD4-859C-962FC82C0FE8}" destId="{6CDE17FE-F043-4E3F-AABF-E9D40BD4367D}" srcOrd="2" destOrd="0" parTransId="{79E5249E-303F-4C3C-9091-ED9A65803DAE}" sibTransId="{2FC0B856-D30B-42E6-88EE-0A51F15181EC}"/>
-    <dgm:cxn modelId="{E2B84579-2017-4AAE-B0FA-80E0DCE8EF15}" type="presOf" srcId="{B471A3E4-08B3-4CD4-859C-962FC82C0FE8}" destId="{3F2EFA31-8E42-4D75-ACA6-56E225EF8FF4}" srcOrd="0" destOrd="0" presId="urn:microsoft.com/office/officeart/2005/8/layout/vList5"/>
+    <dgm:cxn modelId="{F95CC39B-2A83-4FDE-A8D8-013E7FDF9DC8}" srcId="{B471A3E4-08B3-4CD4-859C-962FC82C0FE8}" destId="{AB6749C2-A21A-4D03-B884-70CA376B31AD}" srcOrd="1" destOrd="0" parTransId="{7ADC8336-663F-4BB6-910C-C8658652C0C6}" sibTransId="{D2B94901-85C8-4368-932B-114BC01F424C}"/>
+    <dgm:cxn modelId="{46A9736A-53EB-4B1F-BEFC-A4AD9C844549}" srcId="{B471A3E4-08B3-4CD4-859C-962FC82C0FE8}" destId="{913A6484-A464-4270-8779-E13E61903069}" srcOrd="0" destOrd="0" parTransId="{F26E0483-AD84-4F57-8855-A4EEF554FB9B}" sibTransId="{45023082-6F2B-429F-8234-D13EA8E23CD5}"/>
     <dgm:cxn modelId="{2C44228E-79A2-4FC6-912D-715757FB12C3}" type="presParOf" srcId="{3F2EFA31-8E42-4D75-ACA6-56E225EF8FF4}" destId="{8B568617-6992-4414-BD82-B4274C740032}" srcOrd="0" destOrd="0" presId="urn:microsoft.com/office/officeart/2005/8/layout/vList5"/>
     <dgm:cxn modelId="{5F7FF459-4851-4623-8C1A-EE94310CB65D}" type="presParOf" srcId="{8B568617-6992-4414-BD82-B4274C740032}" destId="{498F0EF7-6F0E-4858-A104-13BCD01051C7}" srcOrd="0" destOrd="0" presId="urn:microsoft.com/office/officeart/2005/8/layout/vList5"/>
     <dgm:cxn modelId="{3C48BEB0-3901-4DF5-918A-3C35DCA5CFD0}" type="presParOf" srcId="{3F2EFA31-8E42-4D75-ACA6-56E225EF8FF4}" destId="{DE8FFD82-0078-43D6-B2CC-857A9733E1E9}" srcOrd="1" destOrd="0" presId="urn:microsoft.com/office/officeart/2005/8/layout/vList5"/>
@@ -9239,7 +9380,19 @@
           </a:pPr>
           <a:r>
             <a:rPr lang="fr-FR" sz="1700" kern="1200" dirty="0" smtClean="0"/>
-            <a:t>Mode toute les cases libres</a:t>
+            <a:t>Mode </a:t>
+          </a:r>
+          <a:r>
+            <a:rPr lang="fr-FR" sz="1700" kern="1200" dirty="0" smtClean="0"/>
+            <a:t>« toutes </a:t>
+          </a:r>
+          <a:r>
+            <a:rPr lang="fr-FR" sz="1700" kern="1200" dirty="0" smtClean="0"/>
+            <a:t>les cases </a:t>
+          </a:r>
+          <a:r>
+            <a:rPr lang="fr-FR" sz="1700" kern="1200" dirty="0" smtClean="0"/>
+            <a:t>libres »</a:t>
           </a:r>
           <a:endParaRPr lang="fr-FR" sz="1700" kern="1200" dirty="0"/>
         </a:p>
@@ -9398,12 +9551,12 @@
         </a:fontRef>
       </dsp:style>
       <dsp:txBody>
-        <a:bodyPr spcFirstLastPara="0" vert="horz" wrap="square" lIns="60960" tIns="60960" rIns="60960" bIns="60960" numCol="1" spcCol="1270" anchor="ctr" anchorCtr="0">
+        <a:bodyPr spcFirstLastPara="0" vert="horz" wrap="square" lIns="53340" tIns="53340" rIns="53340" bIns="53340" numCol="1" spcCol="1270" anchor="ctr" anchorCtr="0">
           <a:noAutofit/>
         </a:bodyPr>
         <a:lstStyle/>
         <a:p>
-          <a:pPr lvl="0" algn="ctr" defTabSz="711200">
+          <a:pPr lvl="0" algn="ctr" defTabSz="622300">
             <a:lnSpc>
               <a:spcPct val="90000"/>
             </a:lnSpc>
@@ -9415,10 +9568,10 @@
             </a:spcAft>
           </a:pPr>
           <a:r>
-            <a:rPr lang="fr-FR" sz="1600" b="1" kern="1200" dirty="0" smtClean="0"/>
+            <a:rPr lang="fr-FR" sz="1400" b="1" kern="1200" dirty="0" smtClean="0"/>
             <a:t>Visite tardive chez le client</a:t>
           </a:r>
-          <a:endParaRPr lang="fr-FR" sz="1600" b="1" kern="1200" dirty="0"/>
+          <a:endParaRPr lang="fr-FR" sz="1400" b="1" kern="1200" dirty="0"/>
         </a:p>
       </dsp:txBody>
       <dsp:txXfrm>
@@ -9648,12 +9801,12 @@
         </a:fontRef>
       </dsp:style>
       <dsp:txBody>
-        <a:bodyPr spcFirstLastPara="0" vert="horz" wrap="square" lIns="53340" tIns="53340" rIns="53340" bIns="53340" numCol="1" spcCol="1270" anchor="ctr" anchorCtr="0">
+        <a:bodyPr spcFirstLastPara="0" vert="horz" wrap="square" lIns="38100" tIns="38100" rIns="38100" bIns="38100" numCol="1" spcCol="1270" anchor="ctr" anchorCtr="0">
           <a:noAutofit/>
         </a:bodyPr>
         <a:lstStyle/>
         <a:p>
-          <a:pPr lvl="0" algn="ctr" defTabSz="622300">
+          <a:pPr lvl="0" algn="ctr" defTabSz="444500">
             <a:lnSpc>
               <a:spcPct val="90000"/>
             </a:lnSpc>
@@ -9665,10 +9818,10 @@
             </a:spcAft>
           </a:pPr>
           <a:r>
-            <a:rPr lang="fr-FR" sz="1400" kern="1200" dirty="0" smtClean="0"/>
+            <a:rPr lang="fr-FR" sz="1000" kern="1200" dirty="0" smtClean="0"/>
             <a:t>Réalisation de diagrammes</a:t>
           </a:r>
-          <a:endParaRPr lang="fr-FR" sz="1400" kern="1200" dirty="0"/>
+          <a:endParaRPr lang="fr-FR" sz="1000" kern="1200" dirty="0"/>
         </a:p>
       </dsp:txBody>
       <dsp:txXfrm>
@@ -9733,12 +9886,12 @@
         </a:fontRef>
       </dsp:style>
       <dsp:txBody>
-        <a:bodyPr spcFirstLastPara="0" vert="horz" wrap="square" lIns="53340" tIns="53340" rIns="53340" bIns="53340" numCol="1" spcCol="1270" anchor="ctr" anchorCtr="0">
+        <a:bodyPr spcFirstLastPara="0" vert="horz" wrap="square" lIns="45720" tIns="45720" rIns="45720" bIns="45720" numCol="1" spcCol="1270" anchor="ctr" anchorCtr="0">
           <a:noAutofit/>
         </a:bodyPr>
         <a:lstStyle/>
         <a:p>
-          <a:pPr lvl="0" algn="ctr" defTabSz="622300">
+          <a:pPr lvl="0" algn="ctr" defTabSz="533400">
             <a:lnSpc>
               <a:spcPct val="90000"/>
             </a:lnSpc>
@@ -9750,10 +9903,10 @@
             </a:spcAft>
           </a:pPr>
           <a:r>
-            <a:rPr lang="fr-FR" sz="1400" kern="1200" dirty="0" smtClean="0"/>
+            <a:rPr lang="fr-FR" sz="1200" kern="1200" dirty="0" smtClean="0"/>
             <a:t>Discutions</a:t>
           </a:r>
-          <a:endParaRPr lang="fr-FR" sz="1400" kern="1200" dirty="0"/>
+          <a:endParaRPr lang="fr-FR" sz="1200" kern="1200" dirty="0"/>
         </a:p>
       </dsp:txBody>
       <dsp:txXfrm>
@@ -9813,12 +9966,12 @@
         </a:fontRef>
       </dsp:style>
       <dsp:txBody>
-        <a:bodyPr spcFirstLastPara="0" vert="horz" wrap="square" lIns="60960" tIns="60960" rIns="60960" bIns="60960" numCol="1" spcCol="1270" anchor="ctr" anchorCtr="0">
+        <a:bodyPr spcFirstLastPara="0" vert="horz" wrap="square" lIns="45720" tIns="45720" rIns="45720" bIns="45720" numCol="1" spcCol="1270" anchor="ctr" anchorCtr="0">
           <a:noAutofit/>
         </a:bodyPr>
         <a:lstStyle/>
         <a:p>
-          <a:pPr lvl="0" algn="ctr" defTabSz="711200">
+          <a:pPr lvl="0" algn="ctr" defTabSz="533400">
             <a:lnSpc>
               <a:spcPct val="90000"/>
             </a:lnSpc>
@@ -9830,10 +9983,14 @@
             </a:spcAft>
           </a:pPr>
           <a:r>
-            <a:rPr lang="fr-FR" sz="1600" b="1" kern="1200" dirty="0" smtClean="0"/>
-            <a:t>Réflexion en duo</a:t>
+            <a:rPr lang="fr-FR" sz="1200" b="1" kern="1200" dirty="0" smtClean="0"/>
+            <a:t>Réflexion </a:t>
           </a:r>
-          <a:endParaRPr lang="fr-FR" sz="1600" b="1" kern="1200" dirty="0"/>
+          <a:r>
+            <a:rPr lang="fr-FR" sz="1200" b="1" kern="1200" dirty="0" smtClean="0"/>
+            <a:t>en duo</a:t>
+          </a:r>
+          <a:endParaRPr lang="fr-FR" sz="1200" b="1" kern="1200" dirty="0"/>
         </a:p>
       </dsp:txBody>
       <dsp:txXfrm>
@@ -9996,7 +10153,15 @@
           </a:pPr>
           <a:r>
             <a:rPr lang="fr-FR" sz="1400" kern="1200" dirty="0" smtClean="0"/>
-            <a:t>Mode de jeux</a:t>
+            <a:t>Modes </a:t>
+          </a:r>
+          <a:r>
+            <a:rPr lang="fr-FR" sz="1400" kern="1200" dirty="0" smtClean="0"/>
+            <a:t>de </a:t>
+          </a:r>
+          <a:r>
+            <a:rPr lang="fr-FR" sz="1400" kern="1200" dirty="0" smtClean="0"/>
+            <a:t>jeu</a:t>
           </a:r>
           <a:endParaRPr lang="fr-FR" sz="1400" kern="1200" dirty="0"/>
         </a:p>
@@ -10148,12 +10313,12 @@
         </a:fontRef>
       </dsp:style>
       <dsp:txBody>
-        <a:bodyPr spcFirstLastPara="0" vert="horz" wrap="square" lIns="53340" tIns="53340" rIns="53340" bIns="53340" numCol="1" spcCol="1270" anchor="ctr" anchorCtr="0">
+        <a:bodyPr spcFirstLastPara="0" vert="horz" wrap="square" lIns="41910" tIns="41910" rIns="41910" bIns="41910" numCol="1" spcCol="1270" anchor="ctr" anchorCtr="0">
           <a:noAutofit/>
         </a:bodyPr>
         <a:lstStyle/>
         <a:p>
-          <a:pPr lvl="0" algn="ctr" defTabSz="622300">
+          <a:pPr lvl="0" algn="ctr" defTabSz="488950">
             <a:lnSpc>
               <a:spcPct val="90000"/>
             </a:lnSpc>
@@ -10165,10 +10330,10 @@
             </a:spcAft>
           </a:pPr>
           <a:r>
-            <a:rPr lang="fr-FR" sz="1400" kern="1200" dirty="0" smtClean="0"/>
+            <a:rPr lang="fr-FR" sz="1100" kern="1200" dirty="0" smtClean="0"/>
             <a:t>Expérience</a:t>
           </a:r>
-          <a:endParaRPr lang="fr-FR" sz="1400" kern="1200" dirty="0"/>
+          <a:endParaRPr lang="fr-FR" sz="1100" kern="1200" dirty="0"/>
         </a:p>
       </dsp:txBody>
       <dsp:txXfrm>
@@ -10955,7 +11120,11 @@
           </a:pPr>
           <a:r>
             <a:rPr lang="fr-FR" sz="1300" kern="1200" dirty="0" smtClean="0"/>
-            <a:t>Mode de jeu</a:t>
+            <a:t>Modes de </a:t>
+          </a:r>
+          <a:r>
+            <a:rPr lang="fr-FR" sz="1300" kern="1200" dirty="0" smtClean="0"/>
+            <a:t>jeu</a:t>
           </a:r>
           <a:endParaRPr lang="fr-FR" sz="1300" kern="1200" dirty="0"/>
         </a:p>
@@ -11383,7 +11552,11 @@
           </a:pPr>
           <a:r>
             <a:rPr lang="fr-FR" sz="2000" kern="1200" dirty="0" smtClean="0"/>
-            <a:t>Malus arrêtes</a:t>
+            <a:t>Malus </a:t>
+          </a:r>
+          <a:r>
+            <a:rPr lang="fr-FR" sz="2000" kern="1200" dirty="0" smtClean="0"/>
+            <a:t>arrête</a:t>
           </a:r>
           <a:endParaRPr lang="fr-FR" sz="2000" kern="1200" dirty="0"/>
         </a:p>
@@ -11549,7 +11722,11 @@
           </a:pPr>
           <a:r>
             <a:rPr lang="fr-FR" sz="2000" kern="1200" dirty="0" smtClean="0"/>
-            <a:t>Bonus arrêtes</a:t>
+            <a:t>Bonus </a:t>
+          </a:r>
+          <a:r>
+            <a:rPr lang="fr-FR" sz="2000" kern="1200" dirty="0" smtClean="0"/>
+            <a:t>arrête</a:t>
           </a:r>
           <a:endParaRPr lang="fr-FR" sz="2000" kern="1200" dirty="0"/>
         </a:p>
@@ -22522,7 +22699,7 @@
           <a:p>
             <a:fld id="{654A1E13-A93D-4604-81C6-321ED35A9C93}" type="datetimeFigureOut">
               <a:rPr lang="fr-FR" smtClean="0"/>
-              <a:t>04/02/2015</a:t>
+              <a:t>05/02/2015</a:t>
             </a:fld>
             <a:endParaRPr lang="fr-FR"/>
           </a:p>
@@ -22855,6 +23032,90 @@
           <a:p>
             <a:fld id="{38149AE2-9E90-4917-B1F8-B68129E6C27A}" type="slidenum">
               <a:rPr lang="fr-FR" smtClean="0"/>
+              <a:t>5</a:t>
+            </a:fld>
+            <a:endParaRPr lang="fr-FR"/>
+          </a:p>
+        </p:txBody>
+      </p:sp>
+    </p:spTree>
+    <p:extLst>
+      <p:ext uri="{BB962C8B-B14F-4D97-AF65-F5344CB8AC3E}">
+        <p14:creationId xmlns:p14="http://schemas.microsoft.com/office/powerpoint/2010/main" val="4012068868"/>
+      </p:ext>
+    </p:extLst>
+  </p:cSld>
+  <p:clrMapOvr>
+    <a:masterClrMapping/>
+  </p:clrMapOvr>
+</p:notes>
+</file>
+
+<file path=ppt/notesSlides/notesSlide2.xml><?xml version="1.0" encoding="utf-8"?>
+<p:notes xmlns:a="http://schemas.openxmlformats.org/drawingml/2006/main" xmlns:r="http://schemas.openxmlformats.org/officeDocument/2006/relationships" xmlns:p="http://schemas.openxmlformats.org/presentationml/2006/main">
+  <p:cSld>
+    <p:spTree>
+      <p:nvGrpSpPr>
+        <p:cNvPr id="1" name=""/>
+        <p:cNvGrpSpPr/>
+        <p:nvPr/>
+      </p:nvGrpSpPr>
+      <p:grpSpPr>
+        <a:xfrm>
+          <a:off x="0" y="0"/>
+          <a:ext cx="0" cy="0"/>
+          <a:chOff x="0" y="0"/>
+          <a:chExt cx="0" cy="0"/>
+        </a:xfrm>
+      </p:grpSpPr>
+      <p:sp>
+        <p:nvSpPr>
+          <p:cNvPr id="2" name="Espace réservé de l'image des diapositives 1"/>
+          <p:cNvSpPr>
+            <a:spLocks noGrp="1" noRot="1" noChangeAspect="1"/>
+          </p:cNvSpPr>
+          <p:nvPr>
+            <p:ph type="sldImg"/>
+          </p:nvPr>
+        </p:nvSpPr>
+        <p:spPr/>
+      </p:sp>
+      <p:sp>
+        <p:nvSpPr>
+          <p:cNvPr id="3" name="Espace réservé des commentaires 2"/>
+          <p:cNvSpPr>
+            <a:spLocks noGrp="1"/>
+          </p:cNvSpPr>
+          <p:nvPr>
+            <p:ph type="body" idx="1"/>
+          </p:nvPr>
+        </p:nvSpPr>
+        <p:spPr/>
+        <p:txBody>
+          <a:bodyPr/>
+          <a:lstStyle/>
+          <a:p>
+            <a:endParaRPr lang="fr-FR" dirty="0"/>
+          </a:p>
+        </p:txBody>
+      </p:sp>
+      <p:sp>
+        <p:nvSpPr>
+          <p:cNvPr id="4" name="Espace réservé du numéro de diapositive 3"/>
+          <p:cNvSpPr>
+            <a:spLocks noGrp="1"/>
+          </p:cNvSpPr>
+          <p:nvPr>
+            <p:ph type="sldNum" sz="quarter" idx="10"/>
+          </p:nvPr>
+        </p:nvSpPr>
+        <p:spPr/>
+        <p:txBody>
+          <a:bodyPr/>
+          <a:lstStyle/>
+          <a:p>
+            <a:fld id="{38149AE2-9E90-4917-B1F8-B68129E6C27A}" type="slidenum">
+              <a:rPr lang="fr-FR" smtClean="0"/>
               <a:t>10</a:t>
             </a:fld>
             <a:endParaRPr lang="fr-FR"/>
@@ -22874,7 +23135,7 @@
 </p:notes>
 </file>
 
-<file path=ppt/notesSlides/notesSlide2.xml><?xml version="1.0" encoding="utf-8"?>
+<file path=ppt/notesSlides/notesSlide3.xml><?xml version="1.0" encoding="utf-8"?>
 <p:notes xmlns:a="http://schemas.openxmlformats.org/drawingml/2006/main" xmlns:r="http://schemas.openxmlformats.org/officeDocument/2006/relationships" xmlns:p="http://schemas.openxmlformats.org/presentationml/2006/main">
   <p:cSld>
     <p:spTree>
@@ -22986,7 +23247,7 @@
 </p:notes>
 </file>
 
-<file path=ppt/notesSlides/notesSlide3.xml><?xml version="1.0" encoding="utf-8"?>
+<file path=ppt/notesSlides/notesSlide4.xml><?xml version="1.0" encoding="utf-8"?>
 <p:notes xmlns:a="http://schemas.openxmlformats.org/drawingml/2006/main" xmlns:r="http://schemas.openxmlformats.org/officeDocument/2006/relationships" xmlns:p="http://schemas.openxmlformats.org/presentationml/2006/main">
   <p:cSld>
     <p:spTree>
@@ -23091,7 +23352,7 @@
 </p:notes>
 </file>
 
-<file path=ppt/notesSlides/notesSlide4.xml><?xml version="1.0" encoding="utf-8"?>
+<file path=ppt/notesSlides/notesSlide5.xml><?xml version="1.0" encoding="utf-8"?>
 <p:notes xmlns:a="http://schemas.openxmlformats.org/drawingml/2006/main" xmlns:r="http://schemas.openxmlformats.org/officeDocument/2006/relationships" xmlns:p="http://schemas.openxmlformats.org/presentationml/2006/main">
   <p:cSld>
     <p:spTree>
@@ -23455,7 +23716,7 @@
           <a:p>
             <a:fld id="{AA309A6D-C09C-4548-B29A-6CF363A7E532}" type="datetimeFigureOut">
               <a:rPr lang="fr-FR" smtClean="0"/>
-              <a:t>04/02/2015</a:t>
+              <a:t>05/02/2015</a:t>
             </a:fld>
             <a:endParaRPr lang="fr-BE"/>
           </a:p>
@@ -23731,13 +23992,13 @@
   <p:clrMapOvr>
     <a:overrideClrMapping bg1="lt1" tx1="dk1" bg2="lt2" tx2="dk2" accent1="accent1" accent2="accent2" accent3="accent3" accent4="accent4" accent5="accent5" accent6="accent6" hlink="hlink" folHlink="folHlink"/>
   </p:clrMapOvr>
-  <mc:AlternateContent xmlns:mc="http://schemas.openxmlformats.org/markup-compatibility/2006">
-    <mc:Choice xmlns:p14="http://schemas.microsoft.com/office/powerpoint/2010/main" Requires="p14">
+  <mc:AlternateContent xmlns:mc="http://schemas.openxmlformats.org/markup-compatibility/2006" xmlns:p14="http://schemas.microsoft.com/office/powerpoint/2010/main">
+    <mc:Choice Requires="p14">
       <p:transition spd="med" p14:dur="700">
         <p:fade/>
       </p:transition>
     </mc:Choice>
-    <mc:Fallback>
+    <mc:Fallback xmlns="">
       <p:transition spd="med">
         <p:fade/>
       </p:transition>
@@ -23860,7 +24121,7 @@
           <a:p>
             <a:fld id="{AA309A6D-C09C-4548-B29A-6CF363A7E532}" type="datetimeFigureOut">
               <a:rPr lang="fr-FR" smtClean="0"/>
-              <a:t>04/02/2015</a:t>
+              <a:t>05/02/2015</a:t>
             </a:fld>
             <a:endParaRPr lang="fr-BE"/>
           </a:p>
@@ -23913,13 +24174,13 @@
   <p:clrMapOvr>
     <a:overrideClrMapping bg1="lt1" tx1="dk1" bg2="lt2" tx2="dk2" accent1="accent1" accent2="accent2" accent3="accent3" accent4="accent4" accent5="accent5" accent6="accent6" hlink="hlink" folHlink="folHlink"/>
   </p:clrMapOvr>
-  <mc:AlternateContent xmlns:mc="http://schemas.openxmlformats.org/markup-compatibility/2006">
-    <mc:Choice xmlns:p14="http://schemas.microsoft.com/office/powerpoint/2010/main" Requires="p14">
+  <mc:AlternateContent xmlns:mc="http://schemas.openxmlformats.org/markup-compatibility/2006" xmlns:p14="http://schemas.microsoft.com/office/powerpoint/2010/main">
+    <mc:Choice Requires="p14">
       <p:transition spd="med" p14:dur="700">
         <p:fade/>
       </p:transition>
     </mc:Choice>
-    <mc:Fallback>
+    <mc:Fallback xmlns="">
       <p:transition spd="med">
         <p:fade/>
       </p:transition>
@@ -24404,7 +24665,7 @@
           <a:p>
             <a:fld id="{AA309A6D-C09C-4548-B29A-6CF363A7E532}" type="datetimeFigureOut">
               <a:rPr lang="fr-FR" smtClean="0"/>
-              <a:t>04/02/2015</a:t>
+              <a:t>05/02/2015</a:t>
             </a:fld>
             <a:endParaRPr lang="fr-BE"/>
           </a:p>
@@ -24462,13 +24723,13 @@
   <p:clrMapOvr>
     <a:overrideClrMapping bg1="lt1" tx1="dk1" bg2="lt2" tx2="dk2" accent1="accent1" accent2="accent2" accent3="accent3" accent4="accent4" accent5="accent5" accent6="accent6" hlink="hlink" folHlink="folHlink"/>
   </p:clrMapOvr>
-  <mc:AlternateContent xmlns:mc="http://schemas.openxmlformats.org/markup-compatibility/2006">
-    <mc:Choice xmlns:p14="http://schemas.microsoft.com/office/powerpoint/2010/main" Requires="p14">
+  <mc:AlternateContent xmlns:mc="http://schemas.openxmlformats.org/markup-compatibility/2006" xmlns:p14="http://schemas.microsoft.com/office/powerpoint/2010/main">
+    <mc:Choice Requires="p14">
       <p:transition spd="med" p14:dur="700">
         <p:fade/>
       </p:transition>
     </mc:Choice>
-    <mc:Fallback>
+    <mc:Fallback xmlns="">
       <p:transition spd="med">
         <p:fade/>
       </p:transition>
@@ -24549,7 +24810,7 @@
           <a:p>
             <a:fld id="{AA309A6D-C09C-4548-B29A-6CF363A7E532}" type="datetimeFigureOut">
               <a:rPr lang="fr-FR" smtClean="0"/>
-              <a:t>04/02/2015</a:t>
+              <a:t>05/02/2015</a:t>
             </a:fld>
             <a:endParaRPr lang="fr-BE"/>
           </a:p>
@@ -24664,13 +24925,13 @@
   <p:clrMapOvr>
     <a:overrideClrMapping bg1="lt1" tx1="dk1" bg2="lt2" tx2="dk2" accent1="accent1" accent2="accent2" accent3="accent3" accent4="accent4" accent5="accent5" accent6="accent6" hlink="hlink" folHlink="folHlink"/>
   </p:clrMapOvr>
-  <mc:AlternateContent xmlns:mc="http://schemas.openxmlformats.org/markup-compatibility/2006">
-    <mc:Choice xmlns:p14="http://schemas.microsoft.com/office/powerpoint/2010/main" Requires="p14">
+  <mc:AlternateContent xmlns:mc="http://schemas.openxmlformats.org/markup-compatibility/2006" xmlns:p14="http://schemas.microsoft.com/office/powerpoint/2010/main">
+    <mc:Choice Requires="p14">
       <p:transition spd="med" p14:dur="700">
         <p:fade/>
       </p:transition>
     </mc:Choice>
-    <mc:Fallback>
+    <mc:Fallback xmlns="">
       <p:transition spd="med">
         <p:fade/>
       </p:transition>
@@ -25104,7 +25365,7 @@
           <a:p>
             <a:fld id="{AA309A6D-C09C-4548-B29A-6CF363A7E532}" type="datetimeFigureOut">
               <a:rPr lang="fr-FR" smtClean="0"/>
-              <a:t>04/02/2015</a:t>
+              <a:t>05/02/2015</a:t>
             </a:fld>
             <a:endParaRPr lang="fr-BE"/>
           </a:p>
@@ -25324,13 +25585,13 @@
   <p:clrMapOvr>
     <a:overrideClrMapping bg1="lt1" tx1="dk1" bg2="lt2" tx2="dk2" accent1="accent1" accent2="accent2" accent3="accent3" accent4="accent4" accent5="accent5" accent6="accent6" hlink="hlink" folHlink="folHlink"/>
   </p:clrMapOvr>
-  <mc:AlternateContent xmlns:mc="http://schemas.openxmlformats.org/markup-compatibility/2006">
-    <mc:Choice xmlns:p14="http://schemas.microsoft.com/office/powerpoint/2010/main" Requires="p14">
+  <mc:AlternateContent xmlns:mc="http://schemas.openxmlformats.org/markup-compatibility/2006" xmlns:p14="http://schemas.microsoft.com/office/powerpoint/2010/main">
+    <mc:Choice Requires="p14">
       <p:transition spd="med" p14:dur="700">
         <p:fade/>
       </p:transition>
     </mc:Choice>
-    <mc:Fallback>
+    <mc:Fallback xmlns="">
       <p:transition spd="med">
         <p:fade/>
       </p:transition>
@@ -25411,7 +25672,7 @@
           <a:p>
             <a:fld id="{AA309A6D-C09C-4548-B29A-6CF363A7E532}" type="datetimeFigureOut">
               <a:rPr lang="fr-FR" smtClean="0"/>
-              <a:t>04/02/2015</a:t>
+              <a:t>05/02/2015</a:t>
             </a:fld>
             <a:endParaRPr lang="fr-BE"/>
           </a:p>
@@ -25622,13 +25883,13 @@
   <p:clrMapOvr>
     <a:overrideClrMapping bg1="lt1" tx1="dk1" bg2="lt2" tx2="dk2" accent1="accent1" accent2="accent2" accent3="accent3" accent4="accent4" accent5="accent5" accent6="accent6" hlink="hlink" folHlink="folHlink"/>
   </p:clrMapOvr>
-  <mc:AlternateContent xmlns:mc="http://schemas.openxmlformats.org/markup-compatibility/2006">
-    <mc:Choice xmlns:p14="http://schemas.microsoft.com/office/powerpoint/2010/main" Requires="p14">
+  <mc:AlternateContent xmlns:mc="http://schemas.openxmlformats.org/markup-compatibility/2006" xmlns:p14="http://schemas.microsoft.com/office/powerpoint/2010/main">
+    <mc:Choice Requires="p14">
       <p:transition spd="med" p14:dur="700">
         <p:fade/>
       </p:transition>
     </mc:Choice>
-    <mc:Fallback>
+    <mc:Fallback xmlns="">
       <p:transition spd="med">
         <p:fade/>
       </p:transition>
@@ -26082,7 +26343,7 @@
           <a:p>
             <a:fld id="{AA309A6D-C09C-4548-B29A-6CF363A7E532}" type="datetimeFigureOut">
               <a:rPr lang="fr-FR" smtClean="0"/>
-              <a:t>04/02/2015</a:t>
+              <a:t>05/02/2015</a:t>
             </a:fld>
             <a:endParaRPr lang="fr-BE"/>
           </a:p>
@@ -26458,13 +26719,13 @@
   <p:clrMapOvr>
     <a:overrideClrMapping bg1="lt1" tx1="dk1" bg2="lt2" tx2="dk2" accent1="accent1" accent2="accent2" accent3="accent3" accent4="accent4" accent5="accent5" accent6="accent6" hlink="hlink" folHlink="folHlink"/>
   </p:clrMapOvr>
-  <mc:AlternateContent xmlns:mc="http://schemas.openxmlformats.org/markup-compatibility/2006">
-    <mc:Choice xmlns:p14="http://schemas.microsoft.com/office/powerpoint/2010/main" Requires="p14">
+  <mc:AlternateContent xmlns:mc="http://schemas.openxmlformats.org/markup-compatibility/2006" xmlns:p14="http://schemas.microsoft.com/office/powerpoint/2010/main">
+    <mc:Choice Requires="p14">
       <p:transition spd="med" p14:dur="700">
         <p:fade/>
       </p:transition>
     </mc:Choice>
-    <mc:Fallback>
+    <mc:Fallback xmlns="">
       <p:transition spd="med">
         <p:fade/>
       </p:transition>
@@ -26530,7 +26791,7 @@
           <a:p>
             <a:fld id="{AA309A6D-C09C-4548-B29A-6CF363A7E532}" type="datetimeFigureOut">
               <a:rPr lang="fr-FR" smtClean="0"/>
-              <a:t>04/02/2015</a:t>
+              <a:t>05/02/2015</a:t>
             </a:fld>
             <a:endParaRPr lang="fr-BE"/>
           </a:p>
@@ -26588,13 +26849,13 @@
   <p:clrMapOvr>
     <a:masterClrMapping/>
   </p:clrMapOvr>
-  <mc:AlternateContent xmlns:mc="http://schemas.openxmlformats.org/markup-compatibility/2006">
-    <mc:Choice xmlns:p14="http://schemas.microsoft.com/office/powerpoint/2010/main" Requires="p14">
+  <mc:AlternateContent xmlns:mc="http://schemas.openxmlformats.org/markup-compatibility/2006" xmlns:p14="http://schemas.microsoft.com/office/powerpoint/2010/main">
+    <mc:Choice Requires="p14">
       <p:transition spd="med" p14:dur="700">
         <p:fade/>
       </p:transition>
     </mc:Choice>
-    <mc:Fallback>
+    <mc:Fallback xmlns="">
       <p:transition spd="med">
         <p:fade/>
       </p:transition>
@@ -26855,7 +27116,7 @@
           <a:p>
             <a:fld id="{AA309A6D-C09C-4548-B29A-6CF363A7E532}" type="datetimeFigureOut">
               <a:rPr lang="fr-FR" smtClean="0"/>
-              <a:t>04/02/2015</a:t>
+              <a:t>05/02/2015</a:t>
             </a:fld>
             <a:endParaRPr lang="fr-BE"/>
           </a:p>
@@ -26921,13 +27182,13 @@
   <p:clrMapOvr>
     <a:masterClrMapping/>
   </p:clrMapOvr>
-  <mc:AlternateContent xmlns:mc="http://schemas.openxmlformats.org/markup-compatibility/2006">
-    <mc:Choice xmlns:p14="http://schemas.microsoft.com/office/powerpoint/2010/main" Requires="p14">
+  <mc:AlternateContent xmlns:mc="http://schemas.openxmlformats.org/markup-compatibility/2006" xmlns:p14="http://schemas.microsoft.com/office/powerpoint/2010/main">
+    <mc:Choice Requires="p14">
       <p:transition spd="med" p14:dur="700">
         <p:fade/>
       </p:transition>
     </mc:Choice>
-    <mc:Fallback>
+    <mc:Fallback xmlns="">
       <p:transition spd="med">
         <p:fade/>
       </p:transition>
@@ -27599,7 +27860,7 @@
           <a:p>
             <a:fld id="{AA309A6D-C09C-4548-B29A-6CF363A7E532}" type="datetimeFigureOut">
               <a:rPr lang="fr-FR" smtClean="0"/>
-              <a:t>04/02/2015</a:t>
+              <a:t>05/02/2015</a:t>
             </a:fld>
             <a:endParaRPr lang="fr-BE"/>
           </a:p>
@@ -27634,13 +27895,13 @@
   <p:clrMapOvr>
     <a:overrideClrMapping bg1="lt1" tx1="dk1" bg2="lt2" tx2="dk2" accent1="accent1" accent2="accent2" accent3="accent3" accent4="accent4" accent5="accent5" accent6="accent6" hlink="hlink" folHlink="folHlink"/>
   </p:clrMapOvr>
-  <mc:AlternateContent xmlns:mc="http://schemas.openxmlformats.org/markup-compatibility/2006">
-    <mc:Choice xmlns:p14="http://schemas.microsoft.com/office/powerpoint/2010/main" Requires="p14">
+  <mc:AlternateContent xmlns:mc="http://schemas.openxmlformats.org/markup-compatibility/2006" xmlns:p14="http://schemas.microsoft.com/office/powerpoint/2010/main">
+    <mc:Choice Requires="p14">
       <p:transition spd="med" p14:dur="700">
         <p:fade/>
       </p:transition>
     </mc:Choice>
-    <mc:Fallback>
+    <mc:Fallback xmlns="">
       <p:transition spd="med">
         <p:fade/>
       </p:transition>
@@ -28275,7 +28536,7 @@
           <a:p>
             <a:fld id="{AA309A6D-C09C-4548-B29A-6CF363A7E532}" type="datetimeFigureOut">
               <a:rPr lang="fr-FR" smtClean="0"/>
-              <a:t>04/02/2015</a:t>
+              <a:t>05/02/2015</a:t>
             </a:fld>
             <a:endParaRPr lang="fr-BE"/>
           </a:p>
@@ -28310,13 +28571,13 @@
   <p:clrMapOvr>
     <a:masterClrMapping/>
   </p:clrMapOvr>
-  <mc:AlternateContent xmlns:mc="http://schemas.openxmlformats.org/markup-compatibility/2006">
-    <mc:Choice xmlns:p14="http://schemas.microsoft.com/office/powerpoint/2010/main" Requires="p14">
+  <mc:AlternateContent xmlns:mc="http://schemas.openxmlformats.org/markup-compatibility/2006" xmlns:p14="http://schemas.microsoft.com/office/powerpoint/2010/main">
+    <mc:Choice Requires="p14">
       <p:transition spd="med" p14:dur="700">
         <p:fade/>
       </p:transition>
     </mc:Choice>
-    <mc:Fallback>
+    <mc:Fallback xmlns="">
       <p:transition spd="med">
         <p:fade/>
       </p:transition>
@@ -28560,7 +28821,7 @@
           <a:p>
             <a:fld id="{AA309A6D-C09C-4548-B29A-6CF363A7E532}" type="datetimeFigureOut">
               <a:rPr lang="fr-FR" smtClean="0"/>
-              <a:t>04/02/2015</a:t>
+              <a:t>05/02/2015</a:t>
             </a:fld>
             <a:endParaRPr lang="fr-BE"/>
           </a:p>
@@ -28927,13 +29188,13 @@
     <p:sldLayoutId id="2147483682" r:id="rId10"/>
     <p:sldLayoutId id="2147483683" r:id="rId11"/>
   </p:sldLayoutIdLst>
-  <mc:AlternateContent xmlns:mc="http://schemas.openxmlformats.org/markup-compatibility/2006">
-    <mc:Choice xmlns:p14="http://schemas.microsoft.com/office/powerpoint/2010/main" Requires="p14">
+  <mc:AlternateContent xmlns:mc="http://schemas.openxmlformats.org/markup-compatibility/2006" xmlns:p14="http://schemas.microsoft.com/office/powerpoint/2010/main">
+    <mc:Choice Requires="p14">
       <p:transition spd="med" p14:dur="700">
         <p:fade/>
       </p:transition>
     </mc:Choice>
-    <mc:Fallback>
+    <mc:Fallback xmlns="">
       <p:transition spd="med">
         <p:fade/>
       </p:transition>
@@ -29299,7 +29560,7 @@
           <a:p>
             <a:r>
               <a:rPr lang="fr-FR" dirty="0" err="1" smtClean="0"/>
-              <a:t>Picarete</a:t>
+              <a:t>PicArete</a:t>
             </a:r>
             <a:endParaRPr lang="fr-FR" dirty="0"/>
           </a:p>
@@ -29346,6 +29607,52 @@
           </a:extLst>
         </p:spPr>
       </p:pic>
+      <p:sp>
+        <p:nvSpPr>
+          <p:cNvPr id="7" name="Rectangle 6"/>
+          <p:cNvSpPr/>
+          <p:nvPr/>
+        </p:nvSpPr>
+        <p:spPr>
+          <a:xfrm>
+            <a:off x="8220501" y="6402814"/>
+            <a:ext cx="671979" cy="338554"/>
+          </a:xfrm>
+          <a:prstGeom prst="rect">
+            <a:avLst/>
+          </a:prstGeom>
+        </p:spPr>
+        <p:txBody>
+          <a:bodyPr wrap="none">
+            <a:spAutoFit/>
+          </a:bodyPr>
+          <a:lstStyle/>
+          <a:p>
+            <a:fld id="{CF4668DC-857F-487D-BFFA-8C0CA5037977}" type="slidenum">
+              <a:rPr lang="fr-BE" sz="1600">
+                <a:solidFill>
+                  <a:schemeClr val="bg1"/>
+                </a:solidFill>
+              </a:rPr>
+              <a:pPr/>
+              <a:t>1</a:t>
+            </a:fld>
+            <a:r>
+              <a:rPr lang="fr-BE" sz="1600" dirty="0">
+                <a:solidFill>
+                  <a:schemeClr val="bg1"/>
+                </a:solidFill>
+              </a:rPr>
+              <a:t>/ 18</a:t>
+            </a:r>
+            <a:endParaRPr lang="fr-BE" sz="1600" dirty="0">
+              <a:solidFill>
+                <a:schemeClr val="bg1"/>
+              </a:solidFill>
+            </a:endParaRPr>
+          </a:p>
+        </p:txBody>
+      </p:sp>
     </p:spTree>
     <p:extLst>
       <p:ext uri="{BB962C8B-B14F-4D97-AF65-F5344CB8AC3E}">
@@ -29356,13 +29663,13 @@
   <p:clrMapOvr>
     <a:masterClrMapping/>
   </p:clrMapOvr>
-  <mc:AlternateContent xmlns:mc="http://schemas.openxmlformats.org/markup-compatibility/2006">
-    <mc:Choice xmlns:p14="http://schemas.microsoft.com/office/powerpoint/2010/main" Requires="p14">
+  <mc:AlternateContent xmlns:mc="http://schemas.openxmlformats.org/markup-compatibility/2006" xmlns:p14="http://schemas.microsoft.com/office/powerpoint/2010/main">
+    <mc:Choice Requires="p14">
       <p:transition spd="med" p14:dur="700">
         <p:fade/>
       </p:transition>
     </mc:Choice>
-    <mc:Fallback>
+    <mc:Fallback xmlns="">
       <p:transition spd="med">
         <p:fade/>
       </p:transition>
@@ -29447,7 +29754,7 @@
           <p:nvPr>
             <p:extLst>
               <p:ext uri="{D42A27DB-BD31-4B8C-83A1-F6EECF244321}">
-                <p14:modId xmlns:p14="http://schemas.microsoft.com/office/powerpoint/2010/main" val="840497660"/>
+                <p14:modId xmlns:p14="http://schemas.microsoft.com/office/powerpoint/2010/main" val="3023899044"/>
               </p:ext>
             </p:extLst>
           </p:nvPr>
@@ -29913,6 +30220,89 @@
           </a:extLst>
         </p:spPr>
       </p:pic>
+      <p:sp>
+        <p:nvSpPr>
+          <p:cNvPr id="18" name="Rectangle 17"/>
+          <p:cNvSpPr/>
+          <p:nvPr/>
+        </p:nvSpPr>
+        <p:spPr>
+          <a:xfrm>
+            <a:off x="8220501" y="6402814"/>
+            <a:ext cx="671979" cy="338554"/>
+          </a:xfrm>
+          <a:prstGeom prst="rect">
+            <a:avLst/>
+          </a:prstGeom>
+        </p:spPr>
+        <p:txBody>
+          <a:bodyPr wrap="none">
+            <a:spAutoFit/>
+          </a:bodyPr>
+          <a:lstStyle/>
+          <a:p>
+            <a:fld id="{CF4668DC-857F-487D-BFFA-8C0CA5037977}" type="slidenum">
+              <a:rPr lang="fr-BE" sz="1600">
+                <a:solidFill>
+                  <a:schemeClr val="bg1"/>
+                </a:solidFill>
+              </a:rPr>
+              <a:pPr/>
+              <a:t>10</a:t>
+            </a:fld>
+            <a:r>
+              <a:rPr lang="fr-BE" sz="1600" dirty="0">
+                <a:solidFill>
+                  <a:schemeClr val="bg1"/>
+                </a:solidFill>
+              </a:rPr>
+              <a:t>/ 18</a:t>
+            </a:r>
+            <a:endParaRPr lang="fr-BE" sz="1600" dirty="0">
+              <a:solidFill>
+                <a:schemeClr val="bg1"/>
+              </a:solidFill>
+            </a:endParaRPr>
+          </a:p>
+        </p:txBody>
+      </p:sp>
+      <p:sp>
+        <p:nvSpPr>
+          <p:cNvPr id="19" name="Rectangle 18"/>
+          <p:cNvSpPr/>
+          <p:nvPr/>
+        </p:nvSpPr>
+        <p:spPr>
+          <a:xfrm>
+            <a:off x="179512" y="6402814"/>
+            <a:ext cx="3168352" cy="338554"/>
+          </a:xfrm>
+          <a:prstGeom prst="rect">
+            <a:avLst/>
+          </a:prstGeom>
+        </p:spPr>
+        <p:txBody>
+          <a:bodyPr wrap="square">
+            <a:spAutoFit/>
+          </a:bodyPr>
+          <a:lstStyle/>
+          <a:p>
+            <a:r>
+              <a:rPr lang="fr-BE" sz="1600" dirty="0" smtClean="0">
+                <a:solidFill>
+                  <a:schemeClr val="bg1"/>
+                </a:solidFill>
+              </a:rPr>
+              <a:t>II - Conception</a:t>
+            </a:r>
+            <a:endParaRPr lang="fr-BE" sz="1600" dirty="0">
+              <a:solidFill>
+                <a:schemeClr val="bg1"/>
+              </a:solidFill>
+            </a:endParaRPr>
+          </a:p>
+        </p:txBody>
+      </p:sp>
     </p:spTree>
     <p:extLst>
       <p:ext uri="{BB962C8B-B14F-4D97-AF65-F5344CB8AC3E}">
@@ -29923,13 +30313,13 @@
   <p:clrMapOvr>
     <a:masterClrMapping/>
   </p:clrMapOvr>
-  <mc:AlternateContent xmlns:mc="http://schemas.openxmlformats.org/markup-compatibility/2006">
-    <mc:Choice xmlns:p14="http://schemas.microsoft.com/office/powerpoint/2010/main" Requires="p14">
+  <mc:AlternateContent xmlns:mc="http://schemas.openxmlformats.org/markup-compatibility/2006" xmlns:p14="http://schemas.microsoft.com/office/powerpoint/2010/main">
+    <mc:Choice Requires="p14">
       <p:transition spd="med" p14:dur="700">
         <p:fade/>
       </p:transition>
     </mc:Choice>
-    <mc:Fallback>
+    <mc:Fallback xmlns="">
       <p:transition spd="med">
         <p:fade/>
       </p:transition>
@@ -30012,8 +30402,9 @@
             </a:pPr>
             <a:r>
               <a:rPr lang="fr-FR" dirty="0" smtClean="0"/>
-              <a:t>Couleur dé saturées</a:t>
+              <a:t>Couleurs dé-saturées</a:t>
             </a:r>
+            <a:endParaRPr lang="fr-FR" dirty="0" smtClean="0"/>
           </a:p>
           <a:p>
             <a:pPr lvl="1">
@@ -30022,8 +30413,13 @@
             </a:pPr>
             <a:r>
               <a:rPr lang="fr-FR" dirty="0" smtClean="0"/>
-              <a:t>Aplat de couleur</a:t>
+              <a:t>Aplat de </a:t>
             </a:r>
+            <a:r>
+              <a:rPr lang="fr-FR" dirty="0" smtClean="0"/>
+              <a:t>couleurs</a:t>
+            </a:r>
+            <a:endParaRPr lang="fr-FR" dirty="0" smtClean="0"/>
           </a:p>
           <a:p>
             <a:pPr lvl="1">
@@ -30032,7 +30428,11 @@
             </a:pPr>
             <a:r>
               <a:rPr lang="fr-FR" dirty="0" smtClean="0"/>
-              <a:t>Sans fioriture (Pas d’icones)</a:t>
+              <a:t>Sans fioriture (Pas </a:t>
+            </a:r>
+            <a:r>
+              <a:rPr lang="fr-FR" dirty="0" smtClean="0"/>
+              <a:t>d’icones)</a:t>
             </a:r>
             <a:endParaRPr lang="fr-FR" dirty="0"/>
           </a:p>
@@ -30162,6 +30562,89 @@
           </a:extLst>
         </p:spPr>
       </p:pic>
+      <p:sp>
+        <p:nvSpPr>
+          <p:cNvPr id="9" name="Rectangle 8"/>
+          <p:cNvSpPr/>
+          <p:nvPr/>
+        </p:nvSpPr>
+        <p:spPr>
+          <a:xfrm>
+            <a:off x="8220501" y="6402814"/>
+            <a:ext cx="671979" cy="338554"/>
+          </a:xfrm>
+          <a:prstGeom prst="rect">
+            <a:avLst/>
+          </a:prstGeom>
+        </p:spPr>
+        <p:txBody>
+          <a:bodyPr wrap="none">
+            <a:spAutoFit/>
+          </a:bodyPr>
+          <a:lstStyle/>
+          <a:p>
+            <a:fld id="{CF4668DC-857F-487D-BFFA-8C0CA5037977}" type="slidenum">
+              <a:rPr lang="fr-BE" sz="1600">
+                <a:solidFill>
+                  <a:schemeClr val="bg1"/>
+                </a:solidFill>
+              </a:rPr>
+              <a:pPr/>
+              <a:t>11</a:t>
+            </a:fld>
+            <a:r>
+              <a:rPr lang="fr-BE" sz="1600" dirty="0">
+                <a:solidFill>
+                  <a:schemeClr val="bg1"/>
+                </a:solidFill>
+              </a:rPr>
+              <a:t>/ 18</a:t>
+            </a:r>
+            <a:endParaRPr lang="fr-BE" sz="1600" dirty="0">
+              <a:solidFill>
+                <a:schemeClr val="bg1"/>
+              </a:solidFill>
+            </a:endParaRPr>
+          </a:p>
+        </p:txBody>
+      </p:sp>
+      <p:sp>
+        <p:nvSpPr>
+          <p:cNvPr id="10" name="Rectangle 9"/>
+          <p:cNvSpPr/>
+          <p:nvPr/>
+        </p:nvSpPr>
+        <p:spPr>
+          <a:xfrm>
+            <a:off x="179512" y="6402814"/>
+            <a:ext cx="3168352" cy="338554"/>
+          </a:xfrm>
+          <a:prstGeom prst="rect">
+            <a:avLst/>
+          </a:prstGeom>
+        </p:spPr>
+        <p:txBody>
+          <a:bodyPr wrap="square">
+            <a:spAutoFit/>
+          </a:bodyPr>
+          <a:lstStyle/>
+          <a:p>
+            <a:r>
+              <a:rPr lang="fr-BE" sz="1600" dirty="0" smtClean="0">
+                <a:solidFill>
+                  <a:schemeClr val="bg1"/>
+                </a:solidFill>
+              </a:rPr>
+              <a:t>II - Conception</a:t>
+            </a:r>
+            <a:endParaRPr lang="fr-BE" sz="1600" dirty="0">
+              <a:solidFill>
+                <a:schemeClr val="bg1"/>
+              </a:solidFill>
+            </a:endParaRPr>
+          </a:p>
+        </p:txBody>
+      </p:sp>
     </p:spTree>
     <p:extLst>
       <p:ext uri="{BB962C8B-B14F-4D97-AF65-F5344CB8AC3E}">
@@ -30172,13 +30655,13 @@
   <p:clrMapOvr>
     <a:masterClrMapping/>
   </p:clrMapOvr>
-  <mc:AlternateContent xmlns:mc="http://schemas.openxmlformats.org/markup-compatibility/2006">
-    <mc:Choice xmlns:p14="http://schemas.microsoft.com/office/powerpoint/2010/main" Requires="p14">
+  <mc:AlternateContent xmlns:mc="http://schemas.openxmlformats.org/markup-compatibility/2006" xmlns:p14="http://schemas.microsoft.com/office/powerpoint/2010/main">
+    <mc:Choice Requires="p14">
       <p:transition spd="med" p14:dur="700">
         <p:fade/>
       </p:transition>
     </mc:Choice>
-    <mc:Fallback>
+    <mc:Fallback xmlns="">
       <p:transition spd="med">
         <p:fade/>
       </p:transition>
@@ -30242,7 +30725,7 @@
         </p:nvSpPr>
         <p:spPr>
           <a:xfrm>
-            <a:off x="1763688" y="5069518"/>
+            <a:off x="1835696" y="5069518"/>
             <a:ext cx="1800200" cy="936104"/>
           </a:xfrm>
           <a:prstGeom prst="rect">
@@ -30284,7 +30767,7 @@
         </p:nvSpPr>
         <p:spPr>
           <a:xfrm>
-            <a:off x="5436096" y="5089954"/>
+            <a:off x="5508104" y="5089954"/>
             <a:ext cx="1800200" cy="936104"/>
           </a:xfrm>
           <a:prstGeom prst="rect">
@@ -30326,7 +30809,7 @@
         </p:nvSpPr>
         <p:spPr>
           <a:xfrm>
-            <a:off x="3563888" y="5141526"/>
+            <a:off x="3635896" y="5141526"/>
             <a:ext cx="1872208" cy="288032"/>
           </a:xfrm>
           <a:prstGeom prst="leftArrow">
@@ -30367,7 +30850,7 @@
         </p:nvSpPr>
         <p:spPr>
           <a:xfrm>
-            <a:off x="3563888" y="5717590"/>
+            <a:off x="3635896" y="5717590"/>
             <a:ext cx="1872208" cy="288032"/>
           </a:xfrm>
           <a:prstGeom prst="rightArrow">
@@ -30408,7 +30891,7 @@
         </p:nvSpPr>
         <p:spPr>
           <a:xfrm>
-            <a:off x="3563888" y="5069518"/>
+            <a:off x="3635896" y="5069518"/>
             <a:ext cx="1872208" cy="1080120"/>
           </a:xfrm>
           <a:prstGeom prst="rect">
@@ -30460,7 +30943,7 @@
         </p:nvSpPr>
         <p:spPr>
           <a:xfrm>
-            <a:off x="2372026" y="2708920"/>
+            <a:off x="2555776" y="2708920"/>
             <a:ext cx="1800200" cy="720080"/>
           </a:xfrm>
           <a:prstGeom prst="rect">
@@ -30534,7 +31017,7 @@
         </p:nvSpPr>
         <p:spPr>
           <a:xfrm>
-            <a:off x="2372026" y="3429000"/>
+            <a:off x="2555776" y="3429000"/>
             <a:ext cx="1800200" cy="936104"/>
           </a:xfrm>
           <a:prstGeom prst="rect">
@@ -30598,7 +31081,7 @@
         </p:nvSpPr>
         <p:spPr>
           <a:xfrm>
-            <a:off x="4604274" y="2708920"/>
+            <a:off x="4788024" y="2708920"/>
             <a:ext cx="1800200" cy="720080"/>
           </a:xfrm>
           <a:prstGeom prst="rect">
@@ -30643,7 +31126,7 @@
         </p:nvSpPr>
         <p:spPr>
           <a:xfrm>
-            <a:off x="4604274" y="3429000"/>
+            <a:off x="4788024" y="3429000"/>
             <a:ext cx="1800200" cy="936104"/>
           </a:xfrm>
           <a:prstGeom prst="rect">
@@ -30749,6 +31232,89 @@
           </a:p>
         </p:txBody>
       </p:sp>
+      <p:sp>
+        <p:nvSpPr>
+          <p:cNvPr id="18" name="Rectangle 17"/>
+          <p:cNvSpPr/>
+          <p:nvPr/>
+        </p:nvSpPr>
+        <p:spPr>
+          <a:xfrm>
+            <a:off x="8220501" y="6402814"/>
+            <a:ext cx="671979" cy="338554"/>
+          </a:xfrm>
+          <a:prstGeom prst="rect">
+            <a:avLst/>
+          </a:prstGeom>
+        </p:spPr>
+        <p:txBody>
+          <a:bodyPr wrap="none">
+            <a:spAutoFit/>
+          </a:bodyPr>
+          <a:lstStyle/>
+          <a:p>
+            <a:fld id="{CF4668DC-857F-487D-BFFA-8C0CA5037977}" type="slidenum">
+              <a:rPr lang="fr-BE" sz="1600">
+                <a:solidFill>
+                  <a:schemeClr val="bg1"/>
+                </a:solidFill>
+              </a:rPr>
+              <a:pPr/>
+              <a:t>12</a:t>
+            </a:fld>
+            <a:r>
+              <a:rPr lang="fr-BE" sz="1600" dirty="0">
+                <a:solidFill>
+                  <a:schemeClr val="bg1"/>
+                </a:solidFill>
+              </a:rPr>
+              <a:t>/ 18</a:t>
+            </a:r>
+            <a:endParaRPr lang="fr-BE" sz="1600" dirty="0">
+              <a:solidFill>
+                <a:schemeClr val="bg1"/>
+              </a:solidFill>
+            </a:endParaRPr>
+          </a:p>
+        </p:txBody>
+      </p:sp>
+      <p:sp>
+        <p:nvSpPr>
+          <p:cNvPr id="19" name="Rectangle 18"/>
+          <p:cNvSpPr/>
+          <p:nvPr/>
+        </p:nvSpPr>
+        <p:spPr>
+          <a:xfrm>
+            <a:off x="179512" y="6402814"/>
+            <a:ext cx="3168352" cy="338554"/>
+          </a:xfrm>
+          <a:prstGeom prst="rect">
+            <a:avLst/>
+          </a:prstGeom>
+        </p:spPr>
+        <p:txBody>
+          <a:bodyPr wrap="square">
+            <a:spAutoFit/>
+          </a:bodyPr>
+          <a:lstStyle/>
+          <a:p>
+            <a:r>
+              <a:rPr lang="fr-BE" sz="1600" dirty="0" smtClean="0">
+                <a:solidFill>
+                  <a:schemeClr val="bg1"/>
+                </a:solidFill>
+              </a:rPr>
+              <a:t>II - Conception</a:t>
+            </a:r>
+            <a:endParaRPr lang="fr-BE" sz="1600" dirty="0">
+              <a:solidFill>
+                <a:schemeClr val="bg1"/>
+              </a:solidFill>
+            </a:endParaRPr>
+          </a:p>
+        </p:txBody>
+      </p:sp>
     </p:spTree>
     <p:extLst>
       <p:ext uri="{BB962C8B-B14F-4D97-AF65-F5344CB8AC3E}">
@@ -30759,13 +31325,13 @@
   <p:clrMapOvr>
     <a:masterClrMapping/>
   </p:clrMapOvr>
-  <mc:AlternateContent xmlns:mc="http://schemas.openxmlformats.org/markup-compatibility/2006">
-    <mc:Choice xmlns:p14="http://schemas.microsoft.com/office/powerpoint/2010/main" Requires="p14">
+  <mc:AlternateContent xmlns:mc="http://schemas.openxmlformats.org/markup-compatibility/2006" xmlns:p14="http://schemas.microsoft.com/office/powerpoint/2010/main">
+    <mc:Choice Requires="p14">
       <p:transition spd="med" p14:dur="700">
         <p:fade/>
       </p:transition>
     </mc:Choice>
-    <mc:Fallback>
+    <mc:Fallback xmlns="">
       <p:transition spd="med">
         <p:fade/>
       </p:transition>
@@ -30840,6 +31406,140 @@
           </a:p>
         </p:txBody>
       </p:sp>
+      <p:sp>
+        <p:nvSpPr>
+          <p:cNvPr id="8" name="Rectangle 7"/>
+          <p:cNvSpPr/>
+          <p:nvPr/>
+        </p:nvSpPr>
+        <p:spPr>
+          <a:xfrm>
+            <a:off x="8220501" y="6402814"/>
+            <a:ext cx="671979" cy="338554"/>
+          </a:xfrm>
+          <a:prstGeom prst="rect">
+            <a:avLst/>
+          </a:prstGeom>
+        </p:spPr>
+        <p:txBody>
+          <a:bodyPr wrap="none">
+            <a:spAutoFit/>
+          </a:bodyPr>
+          <a:lstStyle/>
+          <a:p>
+            <a:fld id="{CF4668DC-857F-487D-BFFA-8C0CA5037977}" type="slidenum">
+              <a:rPr lang="fr-BE" sz="1600">
+                <a:solidFill>
+                  <a:schemeClr val="bg1"/>
+                </a:solidFill>
+              </a:rPr>
+              <a:pPr/>
+              <a:t>13</a:t>
+            </a:fld>
+            <a:r>
+              <a:rPr lang="fr-BE" sz="1600" dirty="0">
+                <a:solidFill>
+                  <a:schemeClr val="bg1"/>
+                </a:solidFill>
+              </a:rPr>
+              <a:t>/ 18</a:t>
+            </a:r>
+            <a:endParaRPr lang="fr-BE" sz="1600" dirty="0">
+              <a:solidFill>
+                <a:schemeClr val="bg1"/>
+              </a:solidFill>
+            </a:endParaRPr>
+          </a:p>
+        </p:txBody>
+      </p:sp>
+      <p:pic>
+        <p:nvPicPr>
+          <p:cNvPr id="9" name="Picture 6" descr="icons 03"/>
+          <p:cNvPicPr>
+            <a:picLocks noChangeAspect="1" noChangeArrowheads="1"/>
+          </p:cNvPicPr>
+          <p:nvPr/>
+        </p:nvPicPr>
+        <p:blipFill>
+          <a:blip r:embed="rId2" cstate="print">
+            <a:duotone>
+              <a:prstClr val="black"/>
+              <a:schemeClr val="accent1">
+                <a:lumMod val="20000"/>
+                <a:lumOff val="80000"/>
+                <a:tint val="45000"/>
+                <a:satMod val="400000"/>
+              </a:schemeClr>
+            </a:duotone>
+            <a:extLst>
+              <a:ext uri="{28A0092B-C50C-407E-A947-70E740481C1C}">
+                <a14:useLocalDpi xmlns:a14="http://schemas.microsoft.com/office/drawing/2010/main" val="0"/>
+              </a:ext>
+            </a:extLst>
+          </a:blip>
+          <a:srcRect/>
+          <a:stretch>
+            <a:fillRect/>
+          </a:stretch>
+        </p:blipFill>
+        <p:spPr bwMode="auto">
+          <a:xfrm>
+            <a:off x="3763170" y="3459639"/>
+            <a:ext cx="1672926" cy="1683578"/>
+          </a:xfrm>
+          <a:prstGeom prst="rect">
+            <a:avLst/>
+          </a:prstGeom>
+          <a:noFill/>
+          <a:extLst>
+            <a:ext uri="{909E8E84-426E-40DD-AFC4-6F175D3DCCD1}">
+              <a14:hiddenFill xmlns:a14="http://schemas.microsoft.com/office/drawing/2010/main">
+                <a:solidFill>
+                  <a:srgbClr val="FFFFFF"/>
+                </a:solidFill>
+              </a14:hiddenFill>
+            </a:ext>
+          </a:extLst>
+        </p:spPr>
+      </p:pic>
+      <p:sp>
+        <p:nvSpPr>
+          <p:cNvPr id="10" name="Flèche droite 9"/>
+          <p:cNvSpPr/>
+          <p:nvPr/>
+        </p:nvSpPr>
+        <p:spPr>
+          <a:xfrm>
+            <a:off x="516274" y="4157412"/>
+            <a:ext cx="3243628" cy="288032"/>
+          </a:xfrm>
+          <a:prstGeom prst="rightArrow">
+            <a:avLst/>
+          </a:prstGeom>
+        </p:spPr>
+        <p:style>
+          <a:lnRef idx="3">
+            <a:schemeClr val="lt1"/>
+          </a:lnRef>
+          <a:fillRef idx="1">
+            <a:schemeClr val="accent1"/>
+          </a:fillRef>
+          <a:effectRef idx="1">
+            <a:schemeClr val="accent1"/>
+          </a:effectRef>
+          <a:fontRef idx="minor">
+            <a:schemeClr val="lt1"/>
+          </a:fontRef>
+        </p:style>
+        <p:txBody>
+          <a:bodyPr rtlCol="0" anchor="ctr"/>
+          <a:lstStyle/>
+          <a:p>
+            <a:pPr algn="ctr"/>
+            <a:endParaRPr lang="fr-FR"/>
+          </a:p>
+        </p:txBody>
+      </p:sp>
     </p:spTree>
     <p:extLst>
       <p:ext uri="{BB962C8B-B14F-4D97-AF65-F5344CB8AC3E}">
@@ -30850,13 +31550,13 @@
   <p:clrMapOvr>
     <a:masterClrMapping/>
   </p:clrMapOvr>
-  <mc:AlternateContent xmlns:mc="http://schemas.openxmlformats.org/markup-compatibility/2006">
-    <mc:Choice xmlns:p14="http://schemas.microsoft.com/office/powerpoint/2010/main" Requires="p14">
+  <mc:AlternateContent xmlns:mc="http://schemas.openxmlformats.org/markup-compatibility/2006" xmlns:p14="http://schemas.microsoft.com/office/powerpoint/2010/main">
+    <mc:Choice Requires="p14">
       <p:transition spd="med" p14:dur="700">
         <p:fade/>
       </p:transition>
     </mc:Choice>
-    <mc:Fallback>
+    <mc:Fallback xmlns="">
       <p:transition spd="med">
         <p:fade/>
       </p:transition>
@@ -30905,12 +31605,8 @@
           <a:lstStyle/>
           <a:p>
             <a:r>
-              <a:rPr lang="fr-FR" dirty="0" err="1" smtClean="0"/>
-              <a:t>Screen</a:t>
-            </a:r>
-            <a:r>
               <a:rPr lang="fr-FR" dirty="0" smtClean="0"/>
-              <a:t> de </a:t>
+              <a:t>Images de </a:t>
             </a:r>
             <a:r>
               <a:rPr lang="fr-FR" dirty="0" smtClean="0"/>
@@ -30922,7 +31618,7 @@
       </p:sp>
       <p:pic>
         <p:nvPicPr>
-          <p:cNvPr id="1026" name="Picture 2" descr="D:\Documents\COURS\LP\PTUT\PICARETE\SOURCES\SCREEN\Sans-titre-6.png"/>
+          <p:cNvPr id="2" name="Picture 2" descr="D:\Documents\COURS\LP\PTUT\PICARETE\SOURCES\SCREEN\Profile_1.png"/>
           <p:cNvPicPr>
             <a:picLocks noChangeAspect="1" noChangeArrowheads="1"/>
           </p:cNvPicPr>
@@ -30943,8 +31639,8 @@
         </p:blipFill>
         <p:spPr bwMode="auto">
           <a:xfrm>
-            <a:off x="3282989" y="1772815"/>
-            <a:ext cx="2657163" cy="4176465"/>
+            <a:off x="6084168" y="1844824"/>
+            <a:ext cx="2723633" cy="4280942"/>
           </a:xfrm>
           <a:prstGeom prst="rect">
             <a:avLst/>
@@ -30963,7 +31659,7 @@
       </p:pic>
       <p:pic>
         <p:nvPicPr>
-          <p:cNvPr id="1027" name="Picture 3" descr="D:\Documents\COURS\LP\PTUT\PICARETE\SOURCES\SCREEN\Sans-titre-4.png"/>
+          <p:cNvPr id="3" name="Picture 3" descr="D:\Documents\COURS\LP\PTUT\PICARETE\SOURCES\SCREEN\Home.png"/>
           <p:cNvPicPr>
             <a:picLocks noChangeAspect="1" noChangeArrowheads="1"/>
           </p:cNvPicPr>
@@ -30984,8 +31680,8 @@
         </p:blipFill>
         <p:spPr bwMode="auto">
           <a:xfrm>
-            <a:off x="6163309" y="1772814"/>
-            <a:ext cx="2657163" cy="4176465"/>
+            <a:off x="3216519" y="1844824"/>
+            <a:ext cx="2723633" cy="4280942"/>
           </a:xfrm>
           <a:prstGeom prst="rect">
             <a:avLst/>
@@ -31004,7 +31700,7 @@
       </p:pic>
       <p:pic>
         <p:nvPicPr>
-          <p:cNvPr id="1029" name="Picture 5" descr="D:\Documents\COURS\LP\PTUT\PICARETE\SOURCES\SCREEN\Sans-titre-7.png"/>
+          <p:cNvPr id="1028" name="Picture 4" descr="D:\Documents\COURS\LP\PTUT\PICARETE\SOURCES\SCREEN\Loading.png"/>
           <p:cNvPicPr>
             <a:picLocks noChangeAspect="1" noChangeArrowheads="1"/>
           </p:cNvPicPr>
@@ -31025,8 +31721,8 @@
         </p:blipFill>
         <p:spPr bwMode="auto">
           <a:xfrm>
-            <a:off x="409802" y="1772815"/>
-            <a:ext cx="2657163" cy="4176464"/>
+            <a:off x="323528" y="1844824"/>
+            <a:ext cx="2723633" cy="4280942"/>
           </a:xfrm>
           <a:prstGeom prst="rect">
             <a:avLst/>
@@ -31043,6 +31739,89 @@
           </a:extLst>
         </p:spPr>
       </p:pic>
+      <p:sp>
+        <p:nvSpPr>
+          <p:cNvPr id="15" name="Rectangle 14"/>
+          <p:cNvSpPr/>
+          <p:nvPr/>
+        </p:nvSpPr>
+        <p:spPr>
+          <a:xfrm>
+            <a:off x="8220501" y="6402814"/>
+            <a:ext cx="671979" cy="338554"/>
+          </a:xfrm>
+          <a:prstGeom prst="rect">
+            <a:avLst/>
+          </a:prstGeom>
+        </p:spPr>
+        <p:txBody>
+          <a:bodyPr wrap="none">
+            <a:spAutoFit/>
+          </a:bodyPr>
+          <a:lstStyle/>
+          <a:p>
+            <a:fld id="{CF4668DC-857F-487D-BFFA-8C0CA5037977}" type="slidenum">
+              <a:rPr lang="fr-BE" sz="1600">
+                <a:solidFill>
+                  <a:schemeClr val="bg1"/>
+                </a:solidFill>
+              </a:rPr>
+              <a:pPr/>
+              <a:t>14</a:t>
+            </a:fld>
+            <a:r>
+              <a:rPr lang="fr-BE" sz="1600" dirty="0">
+                <a:solidFill>
+                  <a:schemeClr val="bg1"/>
+                </a:solidFill>
+              </a:rPr>
+              <a:t>/ 18</a:t>
+            </a:r>
+            <a:endParaRPr lang="fr-BE" sz="1600" dirty="0">
+              <a:solidFill>
+                <a:schemeClr val="bg1"/>
+              </a:solidFill>
+            </a:endParaRPr>
+          </a:p>
+        </p:txBody>
+      </p:sp>
+      <p:sp>
+        <p:nvSpPr>
+          <p:cNvPr id="16" name="Rectangle 15"/>
+          <p:cNvSpPr/>
+          <p:nvPr/>
+        </p:nvSpPr>
+        <p:spPr>
+          <a:xfrm>
+            <a:off x="179512" y="6402814"/>
+            <a:ext cx="3168352" cy="338554"/>
+          </a:xfrm>
+          <a:prstGeom prst="rect">
+            <a:avLst/>
+          </a:prstGeom>
+        </p:spPr>
+        <p:txBody>
+          <a:bodyPr wrap="square">
+            <a:spAutoFit/>
+          </a:bodyPr>
+          <a:lstStyle/>
+          <a:p>
+            <a:r>
+              <a:rPr lang="fr-BE" sz="1600" dirty="0" smtClean="0">
+                <a:solidFill>
+                  <a:schemeClr val="bg1"/>
+                </a:solidFill>
+              </a:rPr>
+              <a:t>III - Résultat</a:t>
+            </a:r>
+            <a:endParaRPr lang="fr-BE" sz="1600" dirty="0">
+              <a:solidFill>
+                <a:schemeClr val="bg1"/>
+              </a:solidFill>
+            </a:endParaRPr>
+          </a:p>
+        </p:txBody>
+      </p:sp>
     </p:spTree>
     <p:extLst>
       <p:ext uri="{BB962C8B-B14F-4D97-AF65-F5344CB8AC3E}">
@@ -31053,13 +31832,13 @@
   <p:clrMapOvr>
     <a:masterClrMapping/>
   </p:clrMapOvr>
-  <mc:AlternateContent xmlns:mc="http://schemas.openxmlformats.org/markup-compatibility/2006">
-    <mc:Choice xmlns:p14="http://schemas.microsoft.com/office/powerpoint/2010/main" Requires="p14">
+  <mc:AlternateContent xmlns:mc="http://schemas.openxmlformats.org/markup-compatibility/2006" xmlns:p14="http://schemas.microsoft.com/office/powerpoint/2010/main">
+    <mc:Choice Requires="p14">
       <p:transition spd="med" p14:dur="700">
         <p:fade/>
       </p:transition>
     </mc:Choice>
-    <mc:Fallback>
+    <mc:Fallback xmlns="">
       <p:transition spd="med">
         <p:fade/>
       </p:transition>
@@ -31108,12 +31887,8 @@
           <a:lstStyle/>
           <a:p>
             <a:r>
-              <a:rPr lang="fr-FR" dirty="0" err="1" smtClean="0"/>
-              <a:t>Screen</a:t>
-            </a:r>
-            <a:r>
               <a:rPr lang="fr-FR" dirty="0" smtClean="0"/>
-              <a:t> de </a:t>
+              <a:t>Images de </a:t>
             </a:r>
             <a:r>
               <a:rPr lang="fr-FR" dirty="0" smtClean="0"/>
@@ -31125,7 +31900,7 @@
       </p:sp>
       <p:pic>
         <p:nvPicPr>
-          <p:cNvPr id="2050" name="Picture 2" descr="D:\Documents\COURS\LP\PTUT\PICARETE\SOURCES\SCREEN\Sans-titre-5.png"/>
+          <p:cNvPr id="9" name="Picture 2" descr="D:\Documents\COURS\LP\PTUT\PICARETE\SOURCES\SCREEN\Chooser.png"/>
           <p:cNvPicPr>
             <a:picLocks noChangeAspect="1" noChangeArrowheads="1"/>
           </p:cNvPicPr>
@@ -31146,8 +31921,8 @@
         </p:blipFill>
         <p:spPr bwMode="auto">
           <a:xfrm>
-            <a:off x="251520" y="1772816"/>
-            <a:ext cx="2684054" cy="4218732"/>
+            <a:off x="323528" y="1844825"/>
+            <a:ext cx="2723633" cy="4280942"/>
           </a:xfrm>
           <a:prstGeom prst="rect">
             <a:avLst/>
@@ -31166,7 +31941,7 @@
       </p:pic>
       <p:pic>
         <p:nvPicPr>
-          <p:cNvPr id="2051" name="Picture 3" descr="D:\Documents\COURS\LP\PTUT\PICARETE\SOURCES\SCREEN\Sans-titre-2.png"/>
+          <p:cNvPr id="10" name="Picture 3" descr="D:\Documents\COURS\LP\PTUT\PICARETE\SOURCES\SCREEN\IG_1.png"/>
           <p:cNvPicPr>
             <a:picLocks noChangeAspect="1" noChangeArrowheads="1"/>
           </p:cNvPicPr>
@@ -31187,8 +31962,8 @@
         </p:blipFill>
         <p:spPr bwMode="auto">
           <a:xfrm>
-            <a:off x="6156176" y="1772816"/>
-            <a:ext cx="2684054" cy="4218732"/>
+            <a:off x="6084168" y="1844825"/>
+            <a:ext cx="2723633" cy="4280942"/>
           </a:xfrm>
           <a:prstGeom prst="rect">
             <a:avLst/>
@@ -31207,7 +31982,7 @@
       </p:pic>
       <p:pic>
         <p:nvPicPr>
-          <p:cNvPr id="2052" name="Picture 4" descr="D:\Documents\COURS\LP\PTUT\PICARETE\SOURCES\SCREEN\Sans-titre-1.png"/>
+          <p:cNvPr id="11" name="Picture 4" descr="D:\Documents\COURS\LP\PTUT\PICARETE\SOURCES\SCREEN\IG_2.png"/>
           <p:cNvPicPr>
             <a:picLocks noChangeAspect="1" noChangeArrowheads="1"/>
           </p:cNvPicPr>
@@ -31228,8 +32003,8 @@
         </p:blipFill>
         <p:spPr bwMode="auto">
           <a:xfrm>
-            <a:off x="3203848" y="1772816"/>
-            <a:ext cx="2684054" cy="4218732"/>
+            <a:off x="3203848" y="1844825"/>
+            <a:ext cx="2723633" cy="4280942"/>
           </a:xfrm>
           <a:prstGeom prst="rect">
             <a:avLst/>
@@ -31246,6 +32021,89 @@
           </a:extLst>
         </p:spPr>
       </p:pic>
+      <p:sp>
+        <p:nvSpPr>
+          <p:cNvPr id="14" name="Rectangle 13"/>
+          <p:cNvSpPr/>
+          <p:nvPr/>
+        </p:nvSpPr>
+        <p:spPr>
+          <a:xfrm>
+            <a:off x="8220501" y="6402814"/>
+            <a:ext cx="671979" cy="338554"/>
+          </a:xfrm>
+          <a:prstGeom prst="rect">
+            <a:avLst/>
+          </a:prstGeom>
+        </p:spPr>
+        <p:txBody>
+          <a:bodyPr wrap="none">
+            <a:spAutoFit/>
+          </a:bodyPr>
+          <a:lstStyle/>
+          <a:p>
+            <a:fld id="{CF4668DC-857F-487D-BFFA-8C0CA5037977}" type="slidenum">
+              <a:rPr lang="fr-BE" sz="1600">
+                <a:solidFill>
+                  <a:schemeClr val="bg1"/>
+                </a:solidFill>
+              </a:rPr>
+              <a:pPr/>
+              <a:t>15</a:t>
+            </a:fld>
+            <a:r>
+              <a:rPr lang="fr-BE" sz="1600" dirty="0">
+                <a:solidFill>
+                  <a:schemeClr val="bg1"/>
+                </a:solidFill>
+              </a:rPr>
+              <a:t>/ 18</a:t>
+            </a:r>
+            <a:endParaRPr lang="fr-BE" sz="1600" dirty="0">
+              <a:solidFill>
+                <a:schemeClr val="bg1"/>
+              </a:solidFill>
+            </a:endParaRPr>
+          </a:p>
+        </p:txBody>
+      </p:sp>
+      <p:sp>
+        <p:nvSpPr>
+          <p:cNvPr id="15" name="Rectangle 14"/>
+          <p:cNvSpPr/>
+          <p:nvPr/>
+        </p:nvSpPr>
+        <p:spPr>
+          <a:xfrm>
+            <a:off x="179512" y="6402814"/>
+            <a:ext cx="3168352" cy="338554"/>
+          </a:xfrm>
+          <a:prstGeom prst="rect">
+            <a:avLst/>
+          </a:prstGeom>
+        </p:spPr>
+        <p:txBody>
+          <a:bodyPr wrap="square">
+            <a:spAutoFit/>
+          </a:bodyPr>
+          <a:lstStyle/>
+          <a:p>
+            <a:r>
+              <a:rPr lang="fr-BE" sz="1600" dirty="0" smtClean="0">
+                <a:solidFill>
+                  <a:schemeClr val="bg1"/>
+                </a:solidFill>
+              </a:rPr>
+              <a:t>III - Résultat</a:t>
+            </a:r>
+            <a:endParaRPr lang="fr-BE" sz="1600" dirty="0">
+              <a:solidFill>
+                <a:schemeClr val="bg1"/>
+              </a:solidFill>
+            </a:endParaRPr>
+          </a:p>
+        </p:txBody>
+      </p:sp>
     </p:spTree>
     <p:extLst>
       <p:ext uri="{BB962C8B-B14F-4D97-AF65-F5344CB8AC3E}">
@@ -31256,13 +32114,13 @@
   <p:clrMapOvr>
     <a:masterClrMapping/>
   </p:clrMapOvr>
-  <mc:AlternateContent xmlns:mc="http://schemas.openxmlformats.org/markup-compatibility/2006">
-    <mc:Choice xmlns:p14="http://schemas.microsoft.com/office/powerpoint/2010/main" Requires="p14">
+  <mc:AlternateContent xmlns:mc="http://schemas.openxmlformats.org/markup-compatibility/2006" xmlns:p14="http://schemas.microsoft.com/office/powerpoint/2010/main">
+    <mc:Choice Requires="p14">
       <p:transition spd="med" p14:dur="700">
         <p:fade/>
       </p:transition>
     </mc:Choice>
-    <mc:Fallback>
+    <mc:Fallback xmlns="">
       <p:transition spd="med">
         <p:fade/>
       </p:transition>
@@ -31351,7 +32209,15 @@
             </a:r>
             <a:r>
               <a:rPr lang="fr-FR" dirty="0" smtClean="0"/>
-              <a:t> : Objectif fixés </a:t>
+              <a:t> : </a:t>
+            </a:r>
+            <a:r>
+              <a:rPr lang="fr-FR" dirty="0" smtClean="0"/>
+              <a:t>Objectifs </a:t>
+            </a:r>
+            <a:r>
+              <a:rPr lang="fr-FR" dirty="0" smtClean="0"/>
+              <a:t>fixés </a:t>
             </a:r>
             <a:r>
               <a:rPr lang="fr-FR" dirty="0" smtClean="0">
@@ -31404,6 +32270,89 @@
           </a:extLst>
         </p:spPr>
       </p:pic>
+      <p:sp>
+        <p:nvSpPr>
+          <p:cNvPr id="6" name="Rectangle 5"/>
+          <p:cNvSpPr/>
+          <p:nvPr/>
+        </p:nvSpPr>
+        <p:spPr>
+          <a:xfrm>
+            <a:off x="8220501" y="6402814"/>
+            <a:ext cx="671979" cy="338554"/>
+          </a:xfrm>
+          <a:prstGeom prst="rect">
+            <a:avLst/>
+          </a:prstGeom>
+        </p:spPr>
+        <p:txBody>
+          <a:bodyPr wrap="none">
+            <a:spAutoFit/>
+          </a:bodyPr>
+          <a:lstStyle/>
+          <a:p>
+            <a:fld id="{CF4668DC-857F-487D-BFFA-8C0CA5037977}" type="slidenum">
+              <a:rPr lang="fr-BE" sz="1600">
+                <a:solidFill>
+                  <a:schemeClr val="bg1"/>
+                </a:solidFill>
+              </a:rPr>
+              <a:pPr/>
+              <a:t>16</a:t>
+            </a:fld>
+            <a:r>
+              <a:rPr lang="fr-BE" sz="1600" dirty="0">
+                <a:solidFill>
+                  <a:schemeClr val="bg1"/>
+                </a:solidFill>
+              </a:rPr>
+              <a:t>/ 18</a:t>
+            </a:r>
+            <a:endParaRPr lang="fr-BE" sz="1600" dirty="0">
+              <a:solidFill>
+                <a:schemeClr val="bg1"/>
+              </a:solidFill>
+            </a:endParaRPr>
+          </a:p>
+        </p:txBody>
+      </p:sp>
+      <p:sp>
+        <p:nvSpPr>
+          <p:cNvPr id="7" name="Rectangle 6"/>
+          <p:cNvSpPr/>
+          <p:nvPr/>
+        </p:nvSpPr>
+        <p:spPr>
+          <a:xfrm>
+            <a:off x="179512" y="6402814"/>
+            <a:ext cx="3168352" cy="338554"/>
+          </a:xfrm>
+          <a:prstGeom prst="rect">
+            <a:avLst/>
+          </a:prstGeom>
+        </p:spPr>
+        <p:txBody>
+          <a:bodyPr wrap="square">
+            <a:spAutoFit/>
+          </a:bodyPr>
+          <a:lstStyle/>
+          <a:p>
+            <a:r>
+              <a:rPr lang="fr-BE" sz="1600" dirty="0" smtClean="0">
+                <a:solidFill>
+                  <a:schemeClr val="bg1"/>
+                </a:solidFill>
+              </a:rPr>
+              <a:t>III - Résultat</a:t>
+            </a:r>
+            <a:endParaRPr lang="fr-BE" sz="1600" dirty="0">
+              <a:solidFill>
+                <a:schemeClr val="bg1"/>
+              </a:solidFill>
+            </a:endParaRPr>
+          </a:p>
+        </p:txBody>
+      </p:sp>
     </p:spTree>
     <p:extLst>
       <p:ext uri="{BB962C8B-B14F-4D97-AF65-F5344CB8AC3E}">
@@ -31414,13 +32363,13 @@
   <p:clrMapOvr>
     <a:masterClrMapping/>
   </p:clrMapOvr>
-  <mc:AlternateContent xmlns:mc="http://schemas.openxmlformats.org/markup-compatibility/2006">
-    <mc:Choice xmlns:p14="http://schemas.microsoft.com/office/powerpoint/2010/main" Requires="p14">
+  <mc:AlternateContent xmlns:mc="http://schemas.openxmlformats.org/markup-compatibility/2006" xmlns:p14="http://schemas.microsoft.com/office/powerpoint/2010/main">
+    <mc:Choice Requires="p14">
       <p:transition spd="med" p14:dur="700">
         <p:fade/>
       </p:transition>
     </mc:Choice>
-    <mc:Fallback>
+    <mc:Fallback xmlns="">
       <p:transition spd="med">
         <p:fade/>
       </p:transition>
@@ -31668,6 +32617,89 @@
           </p:txBody>
         </p:sp>
       </p:grpSp>
+      <p:sp>
+        <p:nvSpPr>
+          <p:cNvPr id="9" name="Rectangle 8"/>
+          <p:cNvSpPr/>
+          <p:nvPr/>
+        </p:nvSpPr>
+        <p:spPr>
+          <a:xfrm>
+            <a:off x="8220501" y="6402814"/>
+            <a:ext cx="671979" cy="338554"/>
+          </a:xfrm>
+          <a:prstGeom prst="rect">
+            <a:avLst/>
+          </a:prstGeom>
+        </p:spPr>
+        <p:txBody>
+          <a:bodyPr wrap="none">
+            <a:spAutoFit/>
+          </a:bodyPr>
+          <a:lstStyle/>
+          <a:p>
+            <a:fld id="{CF4668DC-857F-487D-BFFA-8C0CA5037977}" type="slidenum">
+              <a:rPr lang="fr-BE" sz="1600">
+                <a:solidFill>
+                  <a:schemeClr val="bg1"/>
+                </a:solidFill>
+              </a:rPr>
+              <a:pPr/>
+              <a:t>17</a:t>
+            </a:fld>
+            <a:r>
+              <a:rPr lang="fr-BE" sz="1600" dirty="0">
+                <a:solidFill>
+                  <a:schemeClr val="bg1"/>
+                </a:solidFill>
+              </a:rPr>
+              <a:t>/ 18</a:t>
+            </a:r>
+            <a:endParaRPr lang="fr-BE" sz="1600" dirty="0">
+              <a:solidFill>
+                <a:schemeClr val="bg1"/>
+              </a:solidFill>
+            </a:endParaRPr>
+          </a:p>
+        </p:txBody>
+      </p:sp>
+      <p:sp>
+        <p:nvSpPr>
+          <p:cNvPr id="10" name="Rectangle 9"/>
+          <p:cNvSpPr/>
+          <p:nvPr/>
+        </p:nvSpPr>
+        <p:spPr>
+          <a:xfrm>
+            <a:off x="179512" y="6402814"/>
+            <a:ext cx="3168352" cy="338554"/>
+          </a:xfrm>
+          <a:prstGeom prst="rect">
+            <a:avLst/>
+          </a:prstGeom>
+        </p:spPr>
+        <p:txBody>
+          <a:bodyPr wrap="square">
+            <a:spAutoFit/>
+          </a:bodyPr>
+          <a:lstStyle/>
+          <a:p>
+            <a:r>
+              <a:rPr lang="fr-BE" sz="1600" dirty="0" smtClean="0">
+                <a:solidFill>
+                  <a:schemeClr val="bg1"/>
+                </a:solidFill>
+              </a:rPr>
+              <a:t>III - Résultat</a:t>
+            </a:r>
+            <a:endParaRPr lang="fr-BE" sz="1600" dirty="0">
+              <a:solidFill>
+                <a:schemeClr val="bg1"/>
+              </a:solidFill>
+            </a:endParaRPr>
+          </a:p>
+        </p:txBody>
+      </p:sp>
     </p:spTree>
     <p:extLst>
       <p:ext uri="{BB962C8B-B14F-4D97-AF65-F5344CB8AC3E}">
@@ -31678,13 +32710,13 @@
   <p:clrMapOvr>
     <a:masterClrMapping/>
   </p:clrMapOvr>
-  <mc:AlternateContent xmlns:mc="http://schemas.openxmlformats.org/markup-compatibility/2006">
-    <mc:Choice xmlns:p14="http://schemas.microsoft.com/office/powerpoint/2010/main" Requires="p14">
+  <mc:AlternateContent xmlns:mc="http://schemas.openxmlformats.org/markup-compatibility/2006" xmlns:p14="http://schemas.microsoft.com/office/powerpoint/2010/main">
+    <mc:Choice Requires="p14">
       <p:transition spd="med" p14:dur="700">
         <p:fade/>
       </p:transition>
     </mc:Choice>
-    <mc:Fallback>
+    <mc:Fallback xmlns="">
       <p:transition spd="med">
         <p:fade/>
       </p:transition>
@@ -31737,12 +32769,12 @@
               <a:t>John </a:t>
             </a:r>
             <a:r>
-              <a:rPr lang="fr-FR" dirty="0" err="1" smtClean="0"/>
-              <a:t>von</a:t>
+              <a:rPr lang="fr-FR" dirty="0" smtClean="0"/>
+              <a:t>Von </a:t>
             </a:r>
             <a:r>
               <a:rPr lang="fr-FR" dirty="0" smtClean="0"/>
-              <a:t> Neumann</a:t>
+              <a:t>Neumann</a:t>
             </a:r>
             <a:endParaRPr lang="fr-FR" dirty="0"/>
           </a:p>
@@ -32129,6 +33161,89 @@
           </p:sp>
         </mc:Fallback>
       </mc:AlternateContent>
+      <p:sp>
+        <p:nvSpPr>
+          <p:cNvPr id="8" name="Rectangle 7"/>
+          <p:cNvSpPr/>
+          <p:nvPr/>
+        </p:nvSpPr>
+        <p:spPr>
+          <a:xfrm>
+            <a:off x="8220501" y="6402814"/>
+            <a:ext cx="671979" cy="338554"/>
+          </a:xfrm>
+          <a:prstGeom prst="rect">
+            <a:avLst/>
+          </a:prstGeom>
+        </p:spPr>
+        <p:txBody>
+          <a:bodyPr wrap="none">
+            <a:spAutoFit/>
+          </a:bodyPr>
+          <a:lstStyle/>
+          <a:p>
+            <a:fld id="{CF4668DC-857F-487D-BFFA-8C0CA5037977}" type="slidenum">
+              <a:rPr lang="fr-BE" sz="1600">
+                <a:solidFill>
+                  <a:schemeClr val="bg1"/>
+                </a:solidFill>
+              </a:rPr>
+              <a:pPr/>
+              <a:t>18</a:t>
+            </a:fld>
+            <a:r>
+              <a:rPr lang="fr-BE" sz="1600" dirty="0">
+                <a:solidFill>
+                  <a:schemeClr val="bg1"/>
+                </a:solidFill>
+              </a:rPr>
+              <a:t>/ 18</a:t>
+            </a:r>
+            <a:endParaRPr lang="fr-BE" sz="1600" dirty="0">
+              <a:solidFill>
+                <a:schemeClr val="bg1"/>
+              </a:solidFill>
+            </a:endParaRPr>
+          </a:p>
+        </p:txBody>
+      </p:sp>
+      <p:sp>
+        <p:nvSpPr>
+          <p:cNvPr id="9" name="Rectangle 8"/>
+          <p:cNvSpPr/>
+          <p:nvPr/>
+        </p:nvSpPr>
+        <p:spPr>
+          <a:xfrm>
+            <a:off x="179512" y="6402814"/>
+            <a:ext cx="3168352" cy="338554"/>
+          </a:xfrm>
+          <a:prstGeom prst="rect">
+            <a:avLst/>
+          </a:prstGeom>
+        </p:spPr>
+        <p:txBody>
+          <a:bodyPr wrap="square">
+            <a:spAutoFit/>
+          </a:bodyPr>
+          <a:lstStyle/>
+          <a:p>
+            <a:r>
+              <a:rPr lang="fr-BE" sz="1600" dirty="0" smtClean="0">
+                <a:solidFill>
+                  <a:schemeClr val="bg1"/>
+                </a:solidFill>
+              </a:rPr>
+              <a:t>IV - Démo</a:t>
+            </a:r>
+            <a:endParaRPr lang="fr-BE" sz="1600" dirty="0">
+              <a:solidFill>
+                <a:schemeClr val="bg1"/>
+              </a:solidFill>
+            </a:endParaRPr>
+          </a:p>
+        </p:txBody>
+      </p:sp>
     </p:spTree>
     <p:extLst>
       <p:ext uri="{BB962C8B-B14F-4D97-AF65-F5344CB8AC3E}">
@@ -32139,13 +33254,13 @@
   <p:clrMapOvr>
     <a:masterClrMapping/>
   </p:clrMapOvr>
-  <mc:AlternateContent xmlns:mc="http://schemas.openxmlformats.org/markup-compatibility/2006">
-    <mc:Choice xmlns:p14="http://schemas.microsoft.com/office/powerpoint/2010/main" Requires="p14">
+  <mc:AlternateContent xmlns:mc="http://schemas.openxmlformats.org/markup-compatibility/2006" xmlns:p14="http://schemas.microsoft.com/office/powerpoint/2010/main">
+    <mc:Choice Requires="p14">
       <p:transition spd="med" p14:dur="700">
         <p:fade/>
       </p:transition>
     </mc:Choice>
-    <mc:Fallback>
+    <mc:Fallback xmlns="">
       <p:transition spd="med">
         <p:fade/>
       </p:transition>
@@ -32490,6 +33605,52 @@
           </a:extLst>
         </p:spPr>
       </p:pic>
+      <p:sp>
+        <p:nvSpPr>
+          <p:cNvPr id="10" name="Rectangle 9"/>
+          <p:cNvSpPr/>
+          <p:nvPr/>
+        </p:nvSpPr>
+        <p:spPr>
+          <a:xfrm>
+            <a:off x="8220501" y="6402814"/>
+            <a:ext cx="671979" cy="338554"/>
+          </a:xfrm>
+          <a:prstGeom prst="rect">
+            <a:avLst/>
+          </a:prstGeom>
+        </p:spPr>
+        <p:txBody>
+          <a:bodyPr wrap="none">
+            <a:spAutoFit/>
+          </a:bodyPr>
+          <a:lstStyle/>
+          <a:p>
+            <a:fld id="{CF4668DC-857F-487D-BFFA-8C0CA5037977}" type="slidenum">
+              <a:rPr lang="fr-BE" sz="1600">
+                <a:solidFill>
+                  <a:schemeClr val="bg1"/>
+                </a:solidFill>
+              </a:rPr>
+              <a:pPr/>
+              <a:t>2</a:t>
+            </a:fld>
+            <a:r>
+              <a:rPr lang="fr-BE" sz="1600" dirty="0">
+                <a:solidFill>
+                  <a:schemeClr val="bg1"/>
+                </a:solidFill>
+              </a:rPr>
+              <a:t>/ 18</a:t>
+            </a:r>
+            <a:endParaRPr lang="fr-BE" sz="1600" dirty="0">
+              <a:solidFill>
+                <a:schemeClr val="bg1"/>
+              </a:solidFill>
+            </a:endParaRPr>
+          </a:p>
+        </p:txBody>
+      </p:sp>
     </p:spTree>
     <p:extLst>
       <p:ext uri="{BB962C8B-B14F-4D97-AF65-F5344CB8AC3E}">
@@ -32500,13 +33661,13 @@
   <p:clrMapOvr>
     <a:masterClrMapping/>
   </p:clrMapOvr>
-  <mc:AlternateContent xmlns:mc="http://schemas.openxmlformats.org/markup-compatibility/2006">
-    <mc:Choice xmlns:p14="http://schemas.microsoft.com/office/powerpoint/2010/main" Requires="p14">
+  <mc:AlternateContent xmlns:mc="http://schemas.openxmlformats.org/markup-compatibility/2006" xmlns:p14="http://schemas.microsoft.com/office/powerpoint/2010/main">
+    <mc:Choice Requires="p14">
       <p:transition spd="med" p14:dur="700">
         <p:fade/>
       </p:transition>
     </mc:Choice>
-    <mc:Fallback>
+    <mc:Fallback xmlns="">
       <p:transition spd="med">
         <p:fade/>
       </p:transition>
@@ -32581,6 +33742,140 @@
           </a:p>
         </p:txBody>
       </p:sp>
+      <p:sp>
+        <p:nvSpPr>
+          <p:cNvPr id="7" name="Rectangle 6"/>
+          <p:cNvSpPr/>
+          <p:nvPr/>
+        </p:nvSpPr>
+        <p:spPr>
+          <a:xfrm>
+            <a:off x="8220501" y="6402814"/>
+            <a:ext cx="671979" cy="338554"/>
+          </a:xfrm>
+          <a:prstGeom prst="rect">
+            <a:avLst/>
+          </a:prstGeom>
+        </p:spPr>
+        <p:txBody>
+          <a:bodyPr wrap="none">
+            <a:spAutoFit/>
+          </a:bodyPr>
+          <a:lstStyle/>
+          <a:p>
+            <a:fld id="{CF4668DC-857F-487D-BFFA-8C0CA5037977}" type="slidenum">
+              <a:rPr lang="fr-BE" sz="1600">
+                <a:solidFill>
+                  <a:schemeClr val="bg1"/>
+                </a:solidFill>
+              </a:rPr>
+              <a:pPr/>
+              <a:t>3</a:t>
+            </a:fld>
+            <a:r>
+              <a:rPr lang="fr-BE" sz="1600" dirty="0">
+                <a:solidFill>
+                  <a:schemeClr val="bg1"/>
+                </a:solidFill>
+              </a:rPr>
+              <a:t>/ 18</a:t>
+            </a:r>
+            <a:endParaRPr lang="fr-BE" sz="1600" dirty="0">
+              <a:solidFill>
+                <a:schemeClr val="bg1"/>
+              </a:solidFill>
+            </a:endParaRPr>
+          </a:p>
+        </p:txBody>
+      </p:sp>
+      <p:pic>
+        <p:nvPicPr>
+          <p:cNvPr id="9" name="Picture 2" descr="icons 01"/>
+          <p:cNvPicPr>
+            <a:picLocks noChangeAspect="1" noChangeArrowheads="1"/>
+          </p:cNvPicPr>
+          <p:nvPr/>
+        </p:nvPicPr>
+        <p:blipFill>
+          <a:blip r:embed="rId2" cstate="print">
+            <a:duotone>
+              <a:prstClr val="black"/>
+              <a:schemeClr val="accent1">
+                <a:lumMod val="20000"/>
+                <a:lumOff val="80000"/>
+                <a:tint val="45000"/>
+                <a:satMod val="400000"/>
+              </a:schemeClr>
+            </a:duotone>
+            <a:extLst>
+              <a:ext uri="{28A0092B-C50C-407E-A947-70E740481C1C}">
+                <a14:useLocalDpi xmlns:a14="http://schemas.microsoft.com/office/drawing/2010/main" val="0"/>
+              </a:ext>
+            </a:extLst>
+          </a:blip>
+          <a:srcRect/>
+          <a:stretch>
+            <a:fillRect/>
+          </a:stretch>
+        </p:blipFill>
+        <p:spPr bwMode="auto">
+          <a:xfrm>
+            <a:off x="3763170" y="3459639"/>
+            <a:ext cx="1672926" cy="1683578"/>
+          </a:xfrm>
+          <a:prstGeom prst="rect">
+            <a:avLst/>
+          </a:prstGeom>
+          <a:noFill/>
+          <a:extLst>
+            <a:ext uri="{909E8E84-426E-40DD-AFC4-6F175D3DCCD1}">
+              <a14:hiddenFill xmlns:a14="http://schemas.microsoft.com/office/drawing/2010/main">
+                <a:solidFill>
+                  <a:srgbClr val="FFFFFF"/>
+                </a:solidFill>
+              </a14:hiddenFill>
+            </a:ext>
+          </a:extLst>
+        </p:spPr>
+      </p:pic>
+      <p:sp>
+        <p:nvSpPr>
+          <p:cNvPr id="16" name="Flèche droite 15"/>
+          <p:cNvSpPr/>
+          <p:nvPr/>
+        </p:nvSpPr>
+        <p:spPr>
+          <a:xfrm>
+            <a:off x="5432828" y="4149080"/>
+            <a:ext cx="3243628" cy="288032"/>
+          </a:xfrm>
+          <a:prstGeom prst="rightArrow">
+            <a:avLst/>
+          </a:prstGeom>
+        </p:spPr>
+        <p:style>
+          <a:lnRef idx="3">
+            <a:schemeClr val="lt1"/>
+          </a:lnRef>
+          <a:fillRef idx="1">
+            <a:schemeClr val="accent1"/>
+          </a:fillRef>
+          <a:effectRef idx="1">
+            <a:schemeClr val="accent1"/>
+          </a:effectRef>
+          <a:fontRef idx="minor">
+            <a:schemeClr val="lt1"/>
+          </a:fontRef>
+        </p:style>
+        <p:txBody>
+          <a:bodyPr rtlCol="0" anchor="ctr"/>
+          <a:lstStyle/>
+          <a:p>
+            <a:pPr algn="ctr"/>
+            <a:endParaRPr lang="fr-FR"/>
+          </a:p>
+        </p:txBody>
+      </p:sp>
     </p:spTree>
     <p:extLst>
       <p:ext uri="{BB962C8B-B14F-4D97-AF65-F5344CB8AC3E}">
@@ -32591,13 +33886,13 @@
   <p:clrMapOvr>
     <a:masterClrMapping/>
   </p:clrMapOvr>
-  <mc:AlternateContent xmlns:mc="http://schemas.openxmlformats.org/markup-compatibility/2006">
-    <mc:Choice xmlns:p14="http://schemas.microsoft.com/office/powerpoint/2010/main" Requires="p14">
+  <mc:AlternateContent xmlns:mc="http://schemas.openxmlformats.org/markup-compatibility/2006" xmlns:p14="http://schemas.microsoft.com/office/powerpoint/2010/main">
+    <mc:Choice Requires="p14">
       <p:transition spd="med" p14:dur="700">
         <p:fade/>
       </p:transition>
     </mc:Choice>
-    <mc:Fallback>
+    <mc:Fallback xmlns="">
       <p:transition spd="med">
         <p:fade/>
       </p:transition>
@@ -32748,6 +34043,89 @@
           </a:p>
         </p:txBody>
       </p:sp>
+      <p:sp>
+        <p:nvSpPr>
+          <p:cNvPr id="6" name="Rectangle 5"/>
+          <p:cNvSpPr/>
+          <p:nvPr/>
+        </p:nvSpPr>
+        <p:spPr>
+          <a:xfrm>
+            <a:off x="8220501" y="6402814"/>
+            <a:ext cx="671979" cy="338554"/>
+          </a:xfrm>
+          <a:prstGeom prst="rect">
+            <a:avLst/>
+          </a:prstGeom>
+        </p:spPr>
+        <p:txBody>
+          <a:bodyPr wrap="none">
+            <a:spAutoFit/>
+          </a:bodyPr>
+          <a:lstStyle/>
+          <a:p>
+            <a:fld id="{CF4668DC-857F-487D-BFFA-8C0CA5037977}" type="slidenum">
+              <a:rPr lang="fr-BE" sz="1600">
+                <a:solidFill>
+                  <a:schemeClr val="bg1"/>
+                </a:solidFill>
+              </a:rPr>
+              <a:pPr/>
+              <a:t>4</a:t>
+            </a:fld>
+            <a:r>
+              <a:rPr lang="fr-BE" sz="1600" dirty="0">
+                <a:solidFill>
+                  <a:schemeClr val="bg1"/>
+                </a:solidFill>
+              </a:rPr>
+              <a:t>/ 18</a:t>
+            </a:r>
+            <a:endParaRPr lang="fr-BE" sz="1600" dirty="0">
+              <a:solidFill>
+                <a:schemeClr val="bg1"/>
+              </a:solidFill>
+            </a:endParaRPr>
+          </a:p>
+        </p:txBody>
+      </p:sp>
+      <p:sp>
+        <p:nvSpPr>
+          <p:cNvPr id="7" name="Rectangle 6"/>
+          <p:cNvSpPr/>
+          <p:nvPr/>
+        </p:nvSpPr>
+        <p:spPr>
+          <a:xfrm>
+            <a:off x="179512" y="6402814"/>
+            <a:ext cx="3168352" cy="338554"/>
+          </a:xfrm>
+          <a:prstGeom prst="rect">
+            <a:avLst/>
+          </a:prstGeom>
+        </p:spPr>
+        <p:txBody>
+          <a:bodyPr wrap="square">
+            <a:spAutoFit/>
+          </a:bodyPr>
+          <a:lstStyle/>
+          <a:p>
+            <a:r>
+              <a:rPr lang="fr-BE" sz="1600" dirty="0" smtClean="0">
+                <a:solidFill>
+                  <a:schemeClr val="bg1"/>
+                </a:solidFill>
+              </a:rPr>
+              <a:t>I - Pré-production</a:t>
+            </a:r>
+            <a:endParaRPr lang="fr-BE" sz="1600" dirty="0">
+              <a:solidFill>
+                <a:schemeClr val="bg1"/>
+              </a:solidFill>
+            </a:endParaRPr>
+          </a:p>
+        </p:txBody>
+      </p:sp>
     </p:spTree>
     <p:extLst>
       <p:ext uri="{BB962C8B-B14F-4D97-AF65-F5344CB8AC3E}">
@@ -32758,13 +34136,13 @@
   <p:clrMapOvr>
     <a:masterClrMapping/>
   </p:clrMapOvr>
-  <mc:AlternateContent xmlns:mc="http://schemas.openxmlformats.org/markup-compatibility/2006">
-    <mc:Choice xmlns:p14="http://schemas.microsoft.com/office/powerpoint/2010/main" Requires="p14">
+  <mc:AlternateContent xmlns:mc="http://schemas.openxmlformats.org/markup-compatibility/2006" xmlns:p14="http://schemas.microsoft.com/office/powerpoint/2010/main">
+    <mc:Choice Requires="p14">
       <p:transition spd="med" p14:dur="700">
         <p:fade/>
       </p:transition>
     </mc:Choice>
-    <mc:Fallback>
+    <mc:Fallback xmlns="">
       <p:transition spd="med">
         <p:fade/>
       </p:transition>
@@ -33843,12 +35221,7 @@
             </a:schemeClr>
           </a:solidFill>
           <a:ln>
-            <a:solidFill>
-              <a:schemeClr val="tx1">
-                <a:lumMod val="50000"/>
-                <a:lumOff val="50000"/>
-              </a:schemeClr>
-            </a:solidFill>
+            <a:noFill/>
           </a:ln>
         </p:spPr>
         <p:style>
@@ -33897,12 +35270,7 @@
             </a:schemeClr>
           </a:solidFill>
           <a:ln>
-            <a:solidFill>
-              <a:schemeClr val="tx1">
-                <a:lumMod val="50000"/>
-                <a:lumOff val="50000"/>
-              </a:schemeClr>
-            </a:solidFill>
+            <a:noFill/>
           </a:ln>
         </p:spPr>
         <p:style>
@@ -33951,12 +35319,7 @@
             </a:schemeClr>
           </a:solidFill>
           <a:ln>
-            <a:solidFill>
-              <a:schemeClr val="tx1">
-                <a:lumMod val="50000"/>
-                <a:lumOff val="50000"/>
-              </a:schemeClr>
-            </a:solidFill>
+            <a:noFill/>
           </a:ln>
         </p:spPr>
         <p:style>
@@ -34005,12 +35368,7 @@
             </a:schemeClr>
           </a:solidFill>
           <a:ln>
-            <a:solidFill>
-              <a:schemeClr val="tx1">
-                <a:lumMod val="50000"/>
-                <a:lumOff val="50000"/>
-              </a:schemeClr>
-            </a:solidFill>
+            <a:noFill/>
           </a:ln>
         </p:spPr>
         <p:style>
@@ -34059,12 +35417,7 @@
             </a:schemeClr>
           </a:solidFill>
           <a:ln>
-            <a:solidFill>
-              <a:schemeClr val="tx1">
-                <a:lumMod val="50000"/>
-                <a:lumOff val="50000"/>
-              </a:schemeClr>
-            </a:solidFill>
+            <a:noFill/>
           </a:ln>
         </p:spPr>
         <p:style>
@@ -34113,12 +35466,7 @@
             </a:schemeClr>
           </a:solidFill>
           <a:ln>
-            <a:solidFill>
-              <a:schemeClr val="tx1">
-                <a:lumMod val="50000"/>
-                <a:lumOff val="50000"/>
-              </a:schemeClr>
-            </a:solidFill>
+            <a:noFill/>
           </a:ln>
         </p:spPr>
         <p:style>
@@ -34154,7 +35502,7 @@
         </p:nvSpPr>
         <p:spPr>
           <a:xfrm rot="16200000">
-            <a:off x="845585" y="4149080"/>
+            <a:off x="845585" y="4167547"/>
             <a:ext cx="360040" cy="180020"/>
           </a:xfrm>
           <a:prstGeom prst="triangle">
@@ -34167,12 +35515,7 @@
             </a:schemeClr>
           </a:solidFill>
           <a:ln>
-            <a:solidFill>
-              <a:schemeClr val="tx1">
-                <a:lumMod val="50000"/>
-                <a:lumOff val="50000"/>
-              </a:schemeClr>
-            </a:solidFill>
+            <a:noFill/>
           </a:ln>
         </p:spPr>
         <p:style>
@@ -34221,12 +35564,7 @@
             </a:schemeClr>
           </a:solidFill>
           <a:ln>
-            <a:solidFill>
-              <a:schemeClr val="tx1">
-                <a:lumMod val="50000"/>
-                <a:lumOff val="50000"/>
-              </a:schemeClr>
-            </a:solidFill>
+            <a:noFill/>
           </a:ln>
         </p:spPr>
         <p:style>
@@ -34359,7 +35697,7 @@
         </p:nvSpPr>
         <p:spPr>
           <a:xfrm rot="16200000">
-            <a:off x="5063588" y="2419684"/>
+            <a:off x="5066381" y="2410068"/>
             <a:ext cx="1152128" cy="576064"/>
           </a:xfrm>
           <a:prstGeom prst="triangle">
@@ -34409,7 +35747,7 @@
         </p:nvSpPr>
         <p:spPr>
           <a:xfrm>
-            <a:off x="7059144" y="2111118"/>
+            <a:off x="7052324" y="2107946"/>
             <a:ext cx="1152128" cy="1152128"/>
           </a:xfrm>
           <a:prstGeom prst="flowChartProcess">
@@ -34506,7 +35844,7 @@
         </p:nvSpPr>
         <p:spPr>
           <a:xfrm rot="16200000">
-            <a:off x="7347176" y="2408767"/>
+            <a:off x="7340356" y="2395978"/>
             <a:ext cx="1152128" cy="576064"/>
           </a:xfrm>
           <a:prstGeom prst="triangle">
@@ -34556,7 +35894,7 @@
         </p:nvSpPr>
         <p:spPr>
           <a:xfrm>
-            <a:off x="7059144" y="2708920"/>
+            <a:off x="7059144" y="2684010"/>
             <a:ext cx="1152128" cy="576064"/>
           </a:xfrm>
           <a:prstGeom prst="triangle">
@@ -34648,6 +35986,54 @@
       </p:sp>
       <p:sp>
         <p:nvSpPr>
+          <p:cNvPr id="46" name="Organigramme : Processus 45"/>
+          <p:cNvSpPr/>
+          <p:nvPr/>
+        </p:nvSpPr>
+        <p:spPr>
+          <a:xfrm>
+            <a:off x="7059144" y="4487382"/>
+            <a:ext cx="1152128" cy="1152128"/>
+          </a:xfrm>
+          <a:prstGeom prst="flowChartProcess">
+            <a:avLst/>
+          </a:prstGeom>
+          <a:solidFill>
+            <a:srgbClr val="0070C0"/>
+          </a:solidFill>
+          <a:ln>
+            <a:solidFill>
+              <a:schemeClr val="tx2"/>
+            </a:solidFill>
+          </a:ln>
+        </p:spPr>
+        <p:style>
+          <a:lnRef idx="2">
+            <a:schemeClr val="accent1">
+              <a:shade val="50000"/>
+            </a:schemeClr>
+          </a:lnRef>
+          <a:fillRef idx="1">
+            <a:schemeClr val="accent1"/>
+          </a:fillRef>
+          <a:effectRef idx="0">
+            <a:schemeClr val="accent1"/>
+          </a:effectRef>
+          <a:fontRef idx="minor">
+            <a:schemeClr val="lt1"/>
+          </a:fontRef>
+        </p:style>
+        <p:txBody>
+          <a:bodyPr rtlCol="0" anchor="ctr"/>
+          <a:lstStyle/>
+          <a:p>
+            <a:pPr algn="ctr"/>
+            <a:endParaRPr lang="fr-FR"/>
+          </a:p>
+        </p:txBody>
+      </p:sp>
+      <p:sp>
+        <p:nvSpPr>
           <p:cNvPr id="42" name="Triangle isocèle 41"/>
           <p:cNvSpPr/>
           <p:nvPr/>
@@ -34697,13 +36083,63 @@
       </p:sp>
       <p:sp>
         <p:nvSpPr>
+          <p:cNvPr id="44" name="Triangle isocèle 43"/>
+          <p:cNvSpPr/>
+          <p:nvPr/>
+        </p:nvSpPr>
+        <p:spPr>
+          <a:xfrm>
+            <a:off x="4775696" y="5060171"/>
+            <a:ext cx="1152128" cy="576064"/>
+          </a:xfrm>
+          <a:prstGeom prst="triangle">
+            <a:avLst/>
+          </a:prstGeom>
+          <a:solidFill>
+            <a:srgbClr val="BA06A0"/>
+          </a:solidFill>
+          <a:ln>
+            <a:noFill/>
+          </a:ln>
+        </p:spPr>
+        <p:style>
+          <a:lnRef idx="2">
+            <a:schemeClr val="accent1">
+              <a:shade val="50000"/>
+            </a:schemeClr>
+          </a:lnRef>
+          <a:fillRef idx="1">
+            <a:schemeClr val="accent1"/>
+          </a:fillRef>
+          <a:effectRef idx="0">
+            <a:schemeClr val="accent1"/>
+          </a:effectRef>
+          <a:fontRef idx="minor">
+            <a:schemeClr val="lt1"/>
+          </a:fontRef>
+        </p:style>
+        <p:txBody>
+          <a:bodyPr rtlCol="0" anchor="ctr"/>
+          <a:lstStyle/>
+          <a:p>
+            <a:pPr algn="ctr"/>
+            <a:endParaRPr lang="fr-FR">
+              <a:solidFill>
+                <a:srgbClr val="BA06A0"/>
+              </a:solidFill>
+            </a:endParaRPr>
+          </a:p>
+        </p:txBody>
+      </p:sp>
+      <p:sp>
+        <p:nvSpPr>
           <p:cNvPr id="43" name="Triangle isocèle 42"/>
           <p:cNvSpPr/>
           <p:nvPr/>
         </p:nvSpPr>
         <p:spPr>
           <a:xfrm rot="16200000">
-            <a:off x="5063588" y="4785031"/>
+            <a:off x="5063588" y="4772140"/>
             <a:ext cx="1152128" cy="576064"/>
           </a:xfrm>
           <a:prstGeom prst="triangle">
@@ -34747,63 +36183,13 @@
       </p:sp>
       <p:sp>
         <p:nvSpPr>
-          <p:cNvPr id="44" name="Triangle isocèle 43"/>
-          <p:cNvSpPr/>
-          <p:nvPr/>
-        </p:nvSpPr>
-        <p:spPr>
-          <a:xfrm>
-            <a:off x="4775556" y="5085184"/>
-            <a:ext cx="1152128" cy="576064"/>
-          </a:xfrm>
-          <a:prstGeom prst="triangle">
-            <a:avLst/>
-          </a:prstGeom>
-          <a:solidFill>
-            <a:srgbClr val="BA06A0"/>
-          </a:solidFill>
-          <a:ln>
-            <a:noFill/>
-          </a:ln>
-        </p:spPr>
-        <p:style>
-          <a:lnRef idx="2">
-            <a:schemeClr val="accent1">
-              <a:shade val="50000"/>
-            </a:schemeClr>
-          </a:lnRef>
-          <a:fillRef idx="1">
-            <a:schemeClr val="accent1"/>
-          </a:fillRef>
-          <a:effectRef idx="0">
-            <a:schemeClr val="accent1"/>
-          </a:effectRef>
-          <a:fontRef idx="minor">
-            <a:schemeClr val="lt1"/>
-          </a:fontRef>
-        </p:style>
-        <p:txBody>
-          <a:bodyPr rtlCol="0" anchor="ctr"/>
-          <a:lstStyle/>
-          <a:p>
-            <a:pPr algn="ctr"/>
-            <a:endParaRPr lang="fr-FR">
-              <a:solidFill>
-                <a:srgbClr val="BA06A0"/>
-              </a:solidFill>
-            </a:endParaRPr>
-          </a:p>
-        </p:txBody>
-      </p:sp>
-      <p:sp>
-        <p:nvSpPr>
           <p:cNvPr id="45" name="Triangle isocèle 44"/>
           <p:cNvSpPr/>
           <p:nvPr/>
         </p:nvSpPr>
         <p:spPr>
           <a:xfrm rot="5400000">
-            <a:off x="4487524" y="4797152"/>
+            <a:off x="4487664" y="4772139"/>
             <a:ext cx="1152128" cy="576064"/>
           </a:xfrm>
           <a:prstGeom prst="triangle">
@@ -34845,54 +36231,6 @@
           </a:p>
         </p:txBody>
       </p:sp>
-      <p:sp>
-        <p:nvSpPr>
-          <p:cNvPr id="46" name="Organigramme : Processus 45"/>
-          <p:cNvSpPr/>
-          <p:nvPr/>
-        </p:nvSpPr>
-        <p:spPr>
-          <a:xfrm>
-            <a:off x="7059144" y="4487382"/>
-            <a:ext cx="1152128" cy="1152128"/>
-          </a:xfrm>
-          <a:prstGeom prst="flowChartProcess">
-            <a:avLst/>
-          </a:prstGeom>
-          <a:solidFill>
-            <a:srgbClr val="0070C0"/>
-          </a:solidFill>
-          <a:ln>
-            <a:solidFill>
-              <a:schemeClr val="tx2"/>
-            </a:solidFill>
-          </a:ln>
-        </p:spPr>
-        <p:style>
-          <a:lnRef idx="2">
-            <a:schemeClr val="accent1">
-              <a:shade val="50000"/>
-            </a:schemeClr>
-          </a:lnRef>
-          <a:fillRef idx="1">
-            <a:schemeClr val="accent1"/>
-          </a:fillRef>
-          <a:effectRef idx="0">
-            <a:schemeClr val="accent1"/>
-          </a:effectRef>
-          <a:fontRef idx="minor">
-            <a:schemeClr val="lt1"/>
-          </a:fontRef>
-        </p:style>
-        <p:txBody>
-          <a:bodyPr rtlCol="0" anchor="ctr"/>
-          <a:lstStyle/>
-          <a:p>
-            <a:pPr algn="ctr"/>
-            <a:endParaRPr lang="fr-FR"/>
-          </a:p>
-        </p:txBody>
-      </p:sp>
       <p:cxnSp>
         <p:nvCxnSpPr>
           <p:cNvPr id="52" name="Connecteur droit avec flèche 51"/>
@@ -34904,8 +36242,8 @@
         </p:nvCxnSpPr>
         <p:spPr>
           <a:xfrm flipH="1">
-            <a:off x="5351620" y="3263246"/>
-            <a:ext cx="2283588" cy="1224136"/>
+            <a:off x="5351620" y="3260074"/>
+            <a:ext cx="2276768" cy="1227308"/>
           </a:xfrm>
           <a:prstGeom prst="straightConnector1">
             <a:avLst/>
@@ -34940,8 +36278,8 @@
         </p:nvCxnSpPr>
         <p:spPr>
           <a:xfrm flipV="1">
-            <a:off x="5927684" y="2687182"/>
-            <a:ext cx="1131460" cy="10917"/>
+            <a:off x="5927684" y="2684010"/>
+            <a:ext cx="1124640" cy="14089"/>
           </a:xfrm>
           <a:prstGeom prst="straightConnector1">
             <a:avLst/>
@@ -35211,7 +36549,7 @@
           <p:nvPr/>
         </p:nvPicPr>
         <p:blipFill>
-          <a:blip r:embed="rId2" cstate="print">
+          <a:blip r:embed="rId3" cstate="print">
             <a:extLst>
               <a:ext uri="{28A0092B-C50C-407E-A947-70E740481C1C}">
                 <a14:useLocalDpi xmlns:a14="http://schemas.microsoft.com/office/drawing/2010/main" val="0"/>
@@ -35252,7 +36590,7 @@
           <p:nvPr/>
         </p:nvPicPr>
         <p:blipFill>
-          <a:blip r:embed="rId2" cstate="print">
+          <a:blip r:embed="rId3" cstate="print">
             <a:extLst>
               <a:ext uri="{28A0092B-C50C-407E-A947-70E740481C1C}">
                 <a14:useLocalDpi xmlns:a14="http://schemas.microsoft.com/office/drawing/2010/main" val="0"/>
@@ -35293,7 +36631,7 @@
           <p:nvPr/>
         </p:nvPicPr>
         <p:blipFill>
-          <a:blip r:embed="rId2" cstate="print">
+          <a:blip r:embed="rId3" cstate="print">
             <a:extLst>
               <a:ext uri="{28A0092B-C50C-407E-A947-70E740481C1C}">
                 <a14:useLocalDpi xmlns:a14="http://schemas.microsoft.com/office/drawing/2010/main" val="0"/>
@@ -35325,6 +36663,89 @@
           </a:extLst>
         </p:spPr>
       </p:pic>
+      <p:sp>
+        <p:nvSpPr>
+          <p:cNvPr id="59" name="Rectangle 58"/>
+          <p:cNvSpPr/>
+          <p:nvPr/>
+        </p:nvSpPr>
+        <p:spPr>
+          <a:xfrm>
+            <a:off x="8220501" y="6402814"/>
+            <a:ext cx="671979" cy="338554"/>
+          </a:xfrm>
+          <a:prstGeom prst="rect">
+            <a:avLst/>
+          </a:prstGeom>
+        </p:spPr>
+        <p:txBody>
+          <a:bodyPr wrap="none">
+            <a:spAutoFit/>
+          </a:bodyPr>
+          <a:lstStyle/>
+          <a:p>
+            <a:fld id="{CF4668DC-857F-487D-BFFA-8C0CA5037977}" type="slidenum">
+              <a:rPr lang="fr-BE" sz="1600">
+                <a:solidFill>
+                  <a:schemeClr val="bg1"/>
+                </a:solidFill>
+              </a:rPr>
+              <a:pPr/>
+              <a:t>5</a:t>
+            </a:fld>
+            <a:r>
+              <a:rPr lang="fr-BE" sz="1600" dirty="0">
+                <a:solidFill>
+                  <a:schemeClr val="bg1"/>
+                </a:solidFill>
+              </a:rPr>
+              <a:t>/ 18</a:t>
+            </a:r>
+            <a:endParaRPr lang="fr-BE" sz="1600" dirty="0">
+              <a:solidFill>
+                <a:schemeClr val="bg1"/>
+              </a:solidFill>
+            </a:endParaRPr>
+          </a:p>
+        </p:txBody>
+      </p:sp>
+      <p:sp>
+        <p:nvSpPr>
+          <p:cNvPr id="62" name="Rectangle 61"/>
+          <p:cNvSpPr/>
+          <p:nvPr/>
+        </p:nvSpPr>
+        <p:spPr>
+          <a:xfrm>
+            <a:off x="179512" y="6402814"/>
+            <a:ext cx="3168352" cy="338554"/>
+          </a:xfrm>
+          <a:prstGeom prst="rect">
+            <a:avLst/>
+          </a:prstGeom>
+        </p:spPr>
+        <p:txBody>
+          <a:bodyPr wrap="square">
+            <a:spAutoFit/>
+          </a:bodyPr>
+          <a:lstStyle/>
+          <a:p>
+            <a:r>
+              <a:rPr lang="fr-BE" sz="1600" dirty="0" smtClean="0">
+                <a:solidFill>
+                  <a:schemeClr val="bg1"/>
+                </a:solidFill>
+              </a:rPr>
+              <a:t>I - Pré-production</a:t>
+            </a:r>
+            <a:endParaRPr lang="fr-BE" sz="1600" dirty="0">
+              <a:solidFill>
+                <a:schemeClr val="bg1"/>
+              </a:solidFill>
+            </a:endParaRPr>
+          </a:p>
+        </p:txBody>
+      </p:sp>
     </p:spTree>
     <p:extLst>
       <p:ext uri="{BB962C8B-B14F-4D97-AF65-F5344CB8AC3E}">
@@ -35335,13 +36756,13 @@
   <p:clrMapOvr>
     <a:masterClrMapping/>
   </p:clrMapOvr>
-  <mc:AlternateContent xmlns:mc="http://schemas.openxmlformats.org/markup-compatibility/2006">
-    <mc:Choice xmlns:p14="http://schemas.microsoft.com/office/powerpoint/2010/main" Requires="p14">
+  <mc:AlternateContent xmlns:mc="http://schemas.openxmlformats.org/markup-compatibility/2006" xmlns:p14="http://schemas.microsoft.com/office/powerpoint/2010/main">
+    <mc:Choice Requires="p14">
       <p:transition spd="med" p14:dur="700">
         <p:fade/>
       </p:transition>
     </mc:Choice>
-    <mc:Fallback>
+    <mc:Fallback xmlns="">
       <p:transition spd="med">
         <p:fade/>
       </p:transition>
@@ -35403,7 +36824,7 @@
           <p:nvPr>
             <p:extLst>
               <p:ext uri="{D42A27DB-BD31-4B8C-83A1-F6EECF244321}">
-                <p14:modId xmlns:p14="http://schemas.microsoft.com/office/powerpoint/2010/main" val="1193856229"/>
+                <p14:modId xmlns:p14="http://schemas.microsoft.com/office/powerpoint/2010/main" val="3746116393"/>
               </p:ext>
             </p:extLst>
           </p:nvPr>
@@ -35448,6 +36869,89 @@
           </a:p>
         </p:txBody>
       </p:sp>
+      <p:sp>
+        <p:nvSpPr>
+          <p:cNvPr id="8" name="Rectangle 7"/>
+          <p:cNvSpPr/>
+          <p:nvPr/>
+        </p:nvSpPr>
+        <p:spPr>
+          <a:xfrm>
+            <a:off x="8220501" y="6402814"/>
+            <a:ext cx="671979" cy="338554"/>
+          </a:xfrm>
+          <a:prstGeom prst="rect">
+            <a:avLst/>
+          </a:prstGeom>
+        </p:spPr>
+        <p:txBody>
+          <a:bodyPr wrap="none">
+            <a:spAutoFit/>
+          </a:bodyPr>
+          <a:lstStyle/>
+          <a:p>
+            <a:fld id="{CF4668DC-857F-487D-BFFA-8C0CA5037977}" type="slidenum">
+              <a:rPr lang="fr-BE" sz="1600">
+                <a:solidFill>
+                  <a:schemeClr val="bg1"/>
+                </a:solidFill>
+              </a:rPr>
+              <a:pPr/>
+              <a:t>6</a:t>
+            </a:fld>
+            <a:r>
+              <a:rPr lang="fr-BE" sz="1600" dirty="0">
+                <a:solidFill>
+                  <a:schemeClr val="bg1"/>
+                </a:solidFill>
+              </a:rPr>
+              <a:t>/ 18</a:t>
+            </a:r>
+            <a:endParaRPr lang="fr-BE" sz="1600" dirty="0">
+              <a:solidFill>
+                <a:schemeClr val="bg1"/>
+              </a:solidFill>
+            </a:endParaRPr>
+          </a:p>
+        </p:txBody>
+      </p:sp>
+      <p:sp>
+        <p:nvSpPr>
+          <p:cNvPr id="9" name="Rectangle 8"/>
+          <p:cNvSpPr/>
+          <p:nvPr/>
+        </p:nvSpPr>
+        <p:spPr>
+          <a:xfrm>
+            <a:off x="179512" y="6402814"/>
+            <a:ext cx="3168352" cy="338554"/>
+          </a:xfrm>
+          <a:prstGeom prst="rect">
+            <a:avLst/>
+          </a:prstGeom>
+        </p:spPr>
+        <p:txBody>
+          <a:bodyPr wrap="square">
+            <a:spAutoFit/>
+          </a:bodyPr>
+          <a:lstStyle/>
+          <a:p>
+            <a:r>
+              <a:rPr lang="fr-BE" sz="1600" dirty="0" smtClean="0">
+                <a:solidFill>
+                  <a:schemeClr val="bg1"/>
+                </a:solidFill>
+              </a:rPr>
+              <a:t>I - Pré-production</a:t>
+            </a:r>
+            <a:endParaRPr lang="fr-BE" sz="1600" dirty="0">
+              <a:solidFill>
+                <a:schemeClr val="bg1"/>
+              </a:solidFill>
+            </a:endParaRPr>
+          </a:p>
+        </p:txBody>
+      </p:sp>
     </p:spTree>
     <p:extLst>
       <p:ext uri="{BB962C8B-B14F-4D97-AF65-F5344CB8AC3E}">
@@ -35458,13 +36962,13 @@
   <p:clrMapOvr>
     <a:masterClrMapping/>
   </p:clrMapOvr>
-  <mc:AlternateContent xmlns:mc="http://schemas.openxmlformats.org/markup-compatibility/2006">
-    <mc:Choice xmlns:p14="http://schemas.microsoft.com/office/powerpoint/2010/main" Requires="p14">
+  <mc:AlternateContent xmlns:mc="http://schemas.openxmlformats.org/markup-compatibility/2006" xmlns:p14="http://schemas.microsoft.com/office/powerpoint/2010/main">
+    <mc:Choice Requires="p14">
       <p:transition spd="med" p14:dur="700">
         <p:fade/>
       </p:transition>
     </mc:Choice>
-    <mc:Fallback>
+    <mc:Fallback xmlns="">
       <p:transition spd="med">
         <p:fade/>
       </p:transition>
@@ -35527,7 +37031,7 @@
           <p:nvPr>
             <p:extLst>
               <p:ext uri="{D42A27DB-BD31-4B8C-83A1-F6EECF244321}">
-                <p14:modId xmlns:p14="http://schemas.microsoft.com/office/powerpoint/2010/main" val="1065714522"/>
+                <p14:modId xmlns:p14="http://schemas.microsoft.com/office/powerpoint/2010/main" val="633470625"/>
               </p:ext>
             </p:extLst>
           </p:nvPr>
@@ -35542,6 +37046,89 @@
           </a:graphicData>
         </a:graphic>
       </p:graphicFrame>
+      <p:sp>
+        <p:nvSpPr>
+          <p:cNvPr id="6" name="Rectangle 5"/>
+          <p:cNvSpPr/>
+          <p:nvPr/>
+        </p:nvSpPr>
+        <p:spPr>
+          <a:xfrm>
+            <a:off x="8220501" y="6402814"/>
+            <a:ext cx="671979" cy="338554"/>
+          </a:xfrm>
+          <a:prstGeom prst="rect">
+            <a:avLst/>
+          </a:prstGeom>
+        </p:spPr>
+        <p:txBody>
+          <a:bodyPr wrap="none">
+            <a:spAutoFit/>
+          </a:bodyPr>
+          <a:lstStyle/>
+          <a:p>
+            <a:fld id="{CF4668DC-857F-487D-BFFA-8C0CA5037977}" type="slidenum">
+              <a:rPr lang="fr-BE" sz="1600">
+                <a:solidFill>
+                  <a:schemeClr val="bg1"/>
+                </a:solidFill>
+              </a:rPr>
+              <a:pPr/>
+              <a:t>7</a:t>
+            </a:fld>
+            <a:r>
+              <a:rPr lang="fr-BE" sz="1600" dirty="0">
+                <a:solidFill>
+                  <a:schemeClr val="bg1"/>
+                </a:solidFill>
+              </a:rPr>
+              <a:t>/ 18</a:t>
+            </a:r>
+            <a:endParaRPr lang="fr-BE" sz="1600" dirty="0">
+              <a:solidFill>
+                <a:schemeClr val="bg1"/>
+              </a:solidFill>
+            </a:endParaRPr>
+          </a:p>
+        </p:txBody>
+      </p:sp>
+      <p:sp>
+        <p:nvSpPr>
+          <p:cNvPr id="8" name="Rectangle 7"/>
+          <p:cNvSpPr/>
+          <p:nvPr/>
+        </p:nvSpPr>
+        <p:spPr>
+          <a:xfrm>
+            <a:off x="179512" y="6402814"/>
+            <a:ext cx="3168352" cy="338554"/>
+          </a:xfrm>
+          <a:prstGeom prst="rect">
+            <a:avLst/>
+          </a:prstGeom>
+        </p:spPr>
+        <p:txBody>
+          <a:bodyPr wrap="square">
+            <a:spAutoFit/>
+          </a:bodyPr>
+          <a:lstStyle/>
+          <a:p>
+            <a:r>
+              <a:rPr lang="fr-BE" sz="1600" dirty="0" smtClean="0">
+                <a:solidFill>
+                  <a:schemeClr val="bg1"/>
+                </a:solidFill>
+              </a:rPr>
+              <a:t>I - Pré-production</a:t>
+            </a:r>
+            <a:endParaRPr lang="fr-BE" sz="1600" dirty="0">
+              <a:solidFill>
+                <a:schemeClr val="bg1"/>
+              </a:solidFill>
+            </a:endParaRPr>
+          </a:p>
+        </p:txBody>
+      </p:sp>
     </p:spTree>
     <p:extLst>
       <p:ext uri="{BB962C8B-B14F-4D97-AF65-F5344CB8AC3E}">
@@ -35552,13 +37139,13 @@
   <p:clrMapOvr>
     <a:masterClrMapping/>
   </p:clrMapOvr>
-  <mc:AlternateContent xmlns:mc="http://schemas.openxmlformats.org/markup-compatibility/2006">
-    <mc:Choice xmlns:p14="http://schemas.microsoft.com/office/powerpoint/2010/main" Requires="p14">
+  <mc:AlternateContent xmlns:mc="http://schemas.openxmlformats.org/markup-compatibility/2006" xmlns:p14="http://schemas.microsoft.com/office/powerpoint/2010/main">
+    <mc:Choice Requires="p14">
       <p:transition spd="med" p14:dur="700">
         <p:fade/>
       </p:transition>
     </mc:Choice>
-    <mc:Fallback>
+    <mc:Fallback xmlns="">
       <p:transition spd="med">
         <p:fade/>
       </p:transition>
@@ -35633,6 +37220,178 @@
           </a:p>
         </p:txBody>
       </p:sp>
+      <p:sp>
+        <p:nvSpPr>
+          <p:cNvPr id="7" name="Rectangle 6"/>
+          <p:cNvSpPr/>
+          <p:nvPr/>
+        </p:nvSpPr>
+        <p:spPr>
+          <a:xfrm>
+            <a:off x="8220501" y="6402814"/>
+            <a:ext cx="671979" cy="338554"/>
+          </a:xfrm>
+          <a:prstGeom prst="rect">
+            <a:avLst/>
+          </a:prstGeom>
+        </p:spPr>
+        <p:txBody>
+          <a:bodyPr wrap="none">
+            <a:spAutoFit/>
+          </a:bodyPr>
+          <a:lstStyle/>
+          <a:p>
+            <a:fld id="{CF4668DC-857F-487D-BFFA-8C0CA5037977}" type="slidenum">
+              <a:rPr lang="fr-BE" sz="1600">
+                <a:solidFill>
+                  <a:schemeClr val="bg1"/>
+                </a:solidFill>
+              </a:rPr>
+              <a:pPr/>
+              <a:t>8</a:t>
+            </a:fld>
+            <a:r>
+              <a:rPr lang="fr-BE" sz="1600" dirty="0">
+                <a:solidFill>
+                  <a:schemeClr val="bg1"/>
+                </a:solidFill>
+              </a:rPr>
+              <a:t>/ 18</a:t>
+            </a:r>
+            <a:endParaRPr lang="fr-BE" sz="1600" dirty="0">
+              <a:solidFill>
+                <a:schemeClr val="bg1"/>
+              </a:solidFill>
+            </a:endParaRPr>
+          </a:p>
+        </p:txBody>
+      </p:sp>
+      <p:pic>
+        <p:nvPicPr>
+          <p:cNvPr id="8" name="Picture 4" descr="icons 02"/>
+          <p:cNvPicPr>
+            <a:picLocks noChangeAspect="1" noChangeArrowheads="1"/>
+          </p:cNvPicPr>
+          <p:nvPr/>
+        </p:nvPicPr>
+        <p:blipFill>
+          <a:blip r:embed="rId2" cstate="print">
+            <a:duotone>
+              <a:prstClr val="black"/>
+              <a:schemeClr val="accent1">
+                <a:lumMod val="20000"/>
+                <a:lumOff val="80000"/>
+                <a:tint val="45000"/>
+                <a:satMod val="400000"/>
+              </a:schemeClr>
+            </a:duotone>
+            <a:extLst>
+              <a:ext uri="{28A0092B-C50C-407E-A947-70E740481C1C}">
+                <a14:useLocalDpi xmlns:a14="http://schemas.microsoft.com/office/drawing/2010/main" val="0"/>
+              </a:ext>
+            </a:extLst>
+          </a:blip>
+          <a:srcRect/>
+          <a:stretch>
+            <a:fillRect/>
+          </a:stretch>
+        </p:blipFill>
+        <p:spPr bwMode="auto">
+          <a:xfrm>
+            <a:off x="3759902" y="3459639"/>
+            <a:ext cx="1672926" cy="1683578"/>
+          </a:xfrm>
+          <a:prstGeom prst="rect">
+            <a:avLst/>
+          </a:prstGeom>
+          <a:noFill/>
+          <a:extLst>
+            <a:ext uri="{909E8E84-426E-40DD-AFC4-6F175D3DCCD1}">
+              <a14:hiddenFill xmlns:a14="http://schemas.microsoft.com/office/drawing/2010/main">
+                <a:solidFill>
+                  <a:srgbClr val="FFFFFF"/>
+                </a:solidFill>
+              </a14:hiddenFill>
+            </a:ext>
+          </a:extLst>
+        </p:spPr>
+      </p:pic>
+      <p:sp>
+        <p:nvSpPr>
+          <p:cNvPr id="3" name="Flèche droite 2"/>
+          <p:cNvSpPr/>
+          <p:nvPr/>
+        </p:nvSpPr>
+        <p:spPr>
+          <a:xfrm>
+            <a:off x="5432828" y="4149080"/>
+            <a:ext cx="3243628" cy="288032"/>
+          </a:xfrm>
+          <a:prstGeom prst="rightArrow">
+            <a:avLst/>
+          </a:prstGeom>
+        </p:spPr>
+        <p:style>
+          <a:lnRef idx="3">
+            <a:schemeClr val="lt1"/>
+          </a:lnRef>
+          <a:fillRef idx="1">
+            <a:schemeClr val="accent1"/>
+          </a:fillRef>
+          <a:effectRef idx="1">
+            <a:schemeClr val="accent1"/>
+          </a:effectRef>
+          <a:fontRef idx="minor">
+            <a:schemeClr val="lt1"/>
+          </a:fontRef>
+        </p:style>
+        <p:txBody>
+          <a:bodyPr rtlCol="0" anchor="ctr"/>
+          <a:lstStyle/>
+          <a:p>
+            <a:pPr algn="ctr"/>
+            <a:endParaRPr lang="fr-FR"/>
+          </a:p>
+        </p:txBody>
+      </p:sp>
+      <p:sp>
+        <p:nvSpPr>
+          <p:cNvPr id="9" name="Flèche droite 8"/>
+          <p:cNvSpPr/>
+          <p:nvPr/>
+        </p:nvSpPr>
+        <p:spPr>
+          <a:xfrm>
+            <a:off x="516274" y="4157412"/>
+            <a:ext cx="3243628" cy="288032"/>
+          </a:xfrm>
+          <a:prstGeom prst="rightArrow">
+            <a:avLst/>
+          </a:prstGeom>
+        </p:spPr>
+        <p:style>
+          <a:lnRef idx="3">
+            <a:schemeClr val="lt1"/>
+          </a:lnRef>
+          <a:fillRef idx="1">
+            <a:schemeClr val="accent1"/>
+          </a:fillRef>
+          <a:effectRef idx="1">
+            <a:schemeClr val="accent1"/>
+          </a:effectRef>
+          <a:fontRef idx="minor">
+            <a:schemeClr val="lt1"/>
+          </a:fontRef>
+        </p:style>
+        <p:txBody>
+          <a:bodyPr rtlCol="0" anchor="ctr"/>
+          <a:lstStyle/>
+          <a:p>
+            <a:pPr algn="ctr"/>
+            <a:endParaRPr lang="fr-FR"/>
+          </a:p>
+        </p:txBody>
+      </p:sp>
     </p:spTree>
     <p:extLst>
       <p:ext uri="{BB962C8B-B14F-4D97-AF65-F5344CB8AC3E}">
@@ -35643,13 +37402,13 @@
   <p:clrMapOvr>
     <a:masterClrMapping/>
   </p:clrMapOvr>
-  <mc:AlternateContent xmlns:mc="http://schemas.openxmlformats.org/markup-compatibility/2006">
-    <mc:Choice xmlns:p14="http://schemas.microsoft.com/office/powerpoint/2010/main" Requires="p14">
+  <mc:AlternateContent xmlns:mc="http://schemas.openxmlformats.org/markup-compatibility/2006" xmlns:p14="http://schemas.microsoft.com/office/powerpoint/2010/main">
+    <mc:Choice Requires="p14">
       <p:transition spd="med" p14:dur="700">
         <p:fade/>
       </p:transition>
     </mc:Choice>
-    <mc:Fallback>
+    <mc:Fallback xmlns="">
       <p:transition spd="med">
         <p:fade/>
       </p:transition>
@@ -35718,7 +37477,7 @@
           <p:nvPr>
             <p:extLst>
               <p:ext uri="{D42A27DB-BD31-4B8C-83A1-F6EECF244321}">
-                <p14:modId xmlns:p14="http://schemas.microsoft.com/office/powerpoint/2010/main" val="3187675654"/>
+                <p14:modId xmlns:p14="http://schemas.microsoft.com/office/powerpoint/2010/main" val="3232253594"/>
               </p:ext>
             </p:extLst>
           </p:nvPr>
@@ -35733,6 +37492,89 @@
           </a:graphicData>
         </a:graphic>
       </p:graphicFrame>
+      <p:sp>
+        <p:nvSpPr>
+          <p:cNvPr id="7" name="Rectangle 6"/>
+          <p:cNvSpPr/>
+          <p:nvPr/>
+        </p:nvSpPr>
+        <p:spPr>
+          <a:xfrm>
+            <a:off x="8220501" y="6402814"/>
+            <a:ext cx="671979" cy="338554"/>
+          </a:xfrm>
+          <a:prstGeom prst="rect">
+            <a:avLst/>
+          </a:prstGeom>
+        </p:spPr>
+        <p:txBody>
+          <a:bodyPr wrap="none">
+            <a:spAutoFit/>
+          </a:bodyPr>
+          <a:lstStyle/>
+          <a:p>
+            <a:fld id="{CF4668DC-857F-487D-BFFA-8C0CA5037977}" type="slidenum">
+              <a:rPr lang="fr-BE" sz="1600">
+                <a:solidFill>
+                  <a:schemeClr val="bg1"/>
+                </a:solidFill>
+              </a:rPr>
+              <a:pPr/>
+              <a:t>9</a:t>
+            </a:fld>
+            <a:r>
+              <a:rPr lang="fr-BE" sz="1600" dirty="0">
+                <a:solidFill>
+                  <a:schemeClr val="bg1"/>
+                </a:solidFill>
+              </a:rPr>
+              <a:t>/ 18</a:t>
+            </a:r>
+            <a:endParaRPr lang="fr-BE" sz="1600" dirty="0">
+              <a:solidFill>
+                <a:schemeClr val="bg1"/>
+              </a:solidFill>
+            </a:endParaRPr>
+          </a:p>
+        </p:txBody>
+      </p:sp>
+      <p:sp>
+        <p:nvSpPr>
+          <p:cNvPr id="8" name="Rectangle 7"/>
+          <p:cNvSpPr/>
+          <p:nvPr/>
+        </p:nvSpPr>
+        <p:spPr>
+          <a:xfrm>
+            <a:off x="179512" y="6402814"/>
+            <a:ext cx="3168352" cy="338554"/>
+          </a:xfrm>
+          <a:prstGeom prst="rect">
+            <a:avLst/>
+          </a:prstGeom>
+        </p:spPr>
+        <p:txBody>
+          <a:bodyPr wrap="square">
+            <a:spAutoFit/>
+          </a:bodyPr>
+          <a:lstStyle/>
+          <a:p>
+            <a:r>
+              <a:rPr lang="fr-BE" sz="1600" dirty="0" smtClean="0">
+                <a:solidFill>
+                  <a:schemeClr val="bg1"/>
+                </a:solidFill>
+              </a:rPr>
+              <a:t>II - Conception</a:t>
+            </a:r>
+            <a:endParaRPr lang="fr-BE" sz="1600" dirty="0">
+              <a:solidFill>
+                <a:schemeClr val="bg1"/>
+              </a:solidFill>
+            </a:endParaRPr>
+          </a:p>
+        </p:txBody>
+      </p:sp>
     </p:spTree>
     <p:extLst>
       <p:ext uri="{BB962C8B-B14F-4D97-AF65-F5344CB8AC3E}">
@@ -35743,13 +37585,13 @@
   <p:clrMapOvr>
     <a:masterClrMapping/>
   </p:clrMapOvr>
-  <mc:AlternateContent xmlns:mc="http://schemas.openxmlformats.org/markup-compatibility/2006">
-    <mc:Choice xmlns:p14="http://schemas.microsoft.com/office/powerpoint/2010/main" Requires="p14">
+  <mc:AlternateContent xmlns:mc="http://schemas.openxmlformats.org/markup-compatibility/2006" xmlns:p14="http://schemas.microsoft.com/office/powerpoint/2010/main">
+    <mc:Choice Requires="p14">
       <p:transition spd="med" p14:dur="700">
         <p:fade/>
       </p:transition>
     </mc:Choice>
-    <mc:Fallback>
+    <mc:Fallback xmlns="">
       <p:transition spd="med">
         <p:fade/>
       </p:transition>

</xml_diff>